<commit_message>
Finish the slides at tthv dot rf
</commit_message>
<xml_diff>
--- a/repo/acts/tthv/rf/pres.pptx
+++ b/repo/acts/tthv/rf/pres.pptx
@@ -1,15 +1,43 @@
 
 <file path=ppt/presentation.xml><?xml version="1.0" encoding="utf-8"?>
-<p:presentation xmlns:a="http://schemas.openxmlformats.org/drawingml/2006/main" xmlns:r="http://schemas.openxmlformats.org/officeDocument/2006/relationships" xmlns:p="http://schemas.openxmlformats.org/presentationml/2006/main" xmlns:m="http://schemas.openxmlformats.org/officeDocument/2006/math" xmlns:w="http://schemas.openxmlformats.org/wordprocessingml/2006/main" saveSubsetFonts="1">
+<p:presentation xmlns:a="http://schemas.openxmlformats.org/drawingml/2006/main" xmlns:r="http://schemas.openxmlformats.org/officeDocument/2006/relationships" xmlns:p="http://schemas.openxmlformats.org/presentationml/2006/main" saveSubsetFonts="1">
   <p:sldMasterIdLst>
     <p:sldMasterId id="2147483648" r:id="rId1"/>
   </p:sldMasterIdLst>
   <p:notesMasterIdLst>
-    <p:notesMasterId r:id="rId6"/>
+    <p:notesMasterId r:id="rId32"/>
   </p:notesMasterIdLst>
   <p:sldIdLst>
-    <p:sldId id="256" r:id="rId4"/>
-    <p:sldId id="257" r:id="rId5"/>
+    <p:sldId id="256" r:id="rId2"/>
+    <p:sldId id="257" r:id="rId3"/>
+    <p:sldId id="258" r:id="rId4"/>
+    <p:sldId id="277" r:id="rId5"/>
+    <p:sldId id="276" r:id="rId6"/>
+    <p:sldId id="275" r:id="rId7"/>
+    <p:sldId id="274" r:id="rId8"/>
+    <p:sldId id="273" r:id="rId9"/>
+    <p:sldId id="272" r:id="rId10"/>
+    <p:sldId id="271" r:id="rId11"/>
+    <p:sldId id="270" r:id="rId12"/>
+    <p:sldId id="269" r:id="rId13"/>
+    <p:sldId id="268" r:id="rId14"/>
+    <p:sldId id="259" r:id="rId15"/>
+    <p:sldId id="260" r:id="rId16"/>
+    <p:sldId id="261" r:id="rId17"/>
+    <p:sldId id="285" r:id="rId18"/>
+    <p:sldId id="284" r:id="rId19"/>
+    <p:sldId id="283" r:id="rId20"/>
+    <p:sldId id="282" r:id="rId21"/>
+    <p:sldId id="281" r:id="rId22"/>
+    <p:sldId id="280" r:id="rId23"/>
+    <p:sldId id="279" r:id="rId24"/>
+    <p:sldId id="278" r:id="rId25"/>
+    <p:sldId id="262" r:id="rId26"/>
+    <p:sldId id="263" r:id="rId27"/>
+    <p:sldId id="264" r:id="rId28"/>
+    <p:sldId id="265" r:id="rId29"/>
+    <p:sldId id="266" r:id="rId30"/>
+    <p:sldId id="267" r:id="rId31"/>
   </p:sldIdLst>
   <p:sldSz cx="12192000" cy="6858000"/>
   <p:notesSz cx="6858000" cy="9144000"/>
@@ -108,12 +136,28 @@
       </a:defRPr>
     </a:lvl9pPr>
   </p:defaultTextStyle>
+  <p:extLst>
+    <p:ext uri="{EFAFB233-063F-42B5-8137-9DF3F51BA10A}">
+      <p15:sldGuideLst xmlns:p15="http://schemas.microsoft.com/office/powerpoint/2012/main">
+        <p15:guide id="1" pos="3840">
+          <p15:clr>
+            <a:srgbClr val="A4A3A4"/>
+          </p15:clr>
+        </p15:guide>
+        <p15:guide id="2" orient="horz" pos="2160">
+          <p15:clr>
+            <a:srgbClr val="A4A3A4"/>
+          </p15:clr>
+        </p15:guide>
+      </p15:sldGuideLst>
+    </p:ext>
+  </p:extLst>
 </p:presentation>
 </file>
 
 <file path=ppt/notesMasters/notesMaster1.xml><?xml version="1.0" encoding="utf-8"?>
 <p:notesMaster xmlns:a="http://schemas.openxmlformats.org/drawingml/2006/main" xmlns:r="http://schemas.openxmlformats.org/officeDocument/2006/relationships" xmlns:p="http://schemas.openxmlformats.org/presentationml/2006/main">
-  <p:cSld name="">
+  <p:cSld>
     <p:bg>
       <p:bgRef idx="1001">
         <a:schemeClr val="bg1"/>
@@ -199,7 +243,7 @@
             </a:pPr>
             <a:fld id="{3632E96E-41F7-40C5-8419-297958CC00FA}" type="datetimeFigureOut">
               <a:rPr lang="es-ES"/>
-              <a:t>10/30/2013</a:t>
+              <a:t>01/12/2023</a:t>
             </a:fld>
             <a:endParaRPr lang="es-ES"/>
           </a:p>
@@ -209,7 +253,7 @@
         <p:nvSpPr>
           <p:cNvPr id="4" name="Slide Image Placeholder 3"/>
           <p:cNvSpPr>
-            <a:spLocks noChangeAspect="1" noGrp="1" noRot="1"/>
+            <a:spLocks noGrp="1" noRot="1" noChangeAspect="1"/>
           </p:cNvSpPr>
           <p:nvPr>
             <p:ph type="sldImg" idx="2"/>
@@ -311,7 +355,6 @@
               <a:rPr lang="es-ES"/>
               <a:t>Fifth level</a:t>
             </a:r>
-            <a:endParaRPr lang="es-ES"/>
           </a:p>
         </p:txBody>
       </p:sp>
@@ -381,7 +424,7 @@
             </a:pPr>
             <a:fld id="{2E6999B8-B6B4-4561-A3CD-BBCDAB9FC9D9}" type="slidenum">
               <a:rPr lang="es-ES"/>
-              <a:t>‹#›</a:t>
+              <a:t>‹Nº›</a:t>
             </a:fld>
             <a:endParaRPr lang="es-ES"/>
           </a:p>
@@ -486,8 +529,8 @@
 </file>
 
 <file path=ppt/notesSlides/notesSlide1.xml><?xml version="1.0" encoding="utf-8"?>
-<p:notes xmlns:a="http://schemas.openxmlformats.org/drawingml/2006/main" xmlns:r="http://schemas.openxmlformats.org/officeDocument/2006/relationships" xmlns:p="http://schemas.openxmlformats.org/presentationml/2006/main" xmlns:m="http://schemas.openxmlformats.org/officeDocument/2006/math" xmlns:w="http://schemas.openxmlformats.org/wordprocessingml/2006/main">
-  <p:cSld name="">
+<p:notes xmlns:a="http://schemas.openxmlformats.org/drawingml/2006/main" xmlns:r="http://schemas.openxmlformats.org/officeDocument/2006/relationships" xmlns:p="http://schemas.openxmlformats.org/presentationml/2006/main">
+  <p:cSld>
     <p:spTree>
       <p:nvGrpSpPr>
         <p:cNvPr id="1" name=""/>
@@ -506,7 +549,7 @@
         <p:nvSpPr>
           <p:cNvPr id="2" name="Slide Image Placeholder 1"/>
           <p:cNvSpPr>
-            <a:spLocks noChangeAspect="1" noGrp="1" noRot="1"/>
+            <a:spLocks noGrp="1" noRot="1" noChangeAspect="1"/>
           </p:cNvSpPr>
           <p:nvPr>
             <p:ph type="sldImg"/>
@@ -537,7 +580,7 @@
             <a:pPr>
               <a:defRPr/>
             </a:pPr>
-            <a:endParaRPr lang="es-ES">
+            <a:endParaRPr lang="es-ES" dirty="0">
               <a:latin typeface="Arial"/>
               <a:cs typeface="Arial"/>
             </a:endParaRPr>
@@ -572,12 +615,15 @@
       </p:sp>
     </p:spTree>
   </p:cSld>
+  <p:clrMapOvr>
+    <a:masterClrMapping/>
+  </p:clrMapOvr>
 </p:notes>
 </file>
 
 <file path=ppt/notesSlides/notesSlide2.xml><?xml version="1.0" encoding="utf-8"?>
-<p:notes xmlns:a="http://schemas.openxmlformats.org/drawingml/2006/main" xmlns:r="http://schemas.openxmlformats.org/officeDocument/2006/relationships" xmlns:p="http://schemas.openxmlformats.org/presentationml/2006/main" xmlns:m="http://schemas.openxmlformats.org/officeDocument/2006/math" xmlns:w="http://schemas.openxmlformats.org/wordprocessingml/2006/main">
-  <p:cSld name="">
+<p:notes xmlns:a="http://schemas.openxmlformats.org/drawingml/2006/main" xmlns:r="http://schemas.openxmlformats.org/officeDocument/2006/relationships" xmlns:p="http://schemas.openxmlformats.org/presentationml/2006/main">
+  <p:cSld>
     <p:spTree>
       <p:nvGrpSpPr>
         <p:cNvPr id="1" name=""/>
@@ -596,7 +642,7 @@
         <p:nvSpPr>
           <p:cNvPr id="2085915353" name="Slide Image Placeholder 1"/>
           <p:cNvSpPr>
-            <a:spLocks noChangeAspect="1" noGrp="1" noRot="1"/>
+            <a:spLocks noGrp="1" noRot="1" noChangeAspect="1"/>
           </p:cNvSpPr>
           <p:nvPr>
             <p:ph type="sldImg"/>
@@ -654,7 +700,7 @@
             </a:pPr>
             <a:fld id="{2CFA0668-7658-FB19-D335-9E7B75928417}" type="slidenum">
               <a:rPr lang="es-ES"/>
-              <a:t/>
+              <a:t>2</a:t>
             </a:fld>
             <a:endParaRPr lang="es-ES"/>
           </a:p>
@@ -662,11 +708,14 @@
       </p:sp>
     </p:spTree>
   </p:cSld>
+  <p:clrMapOvr>
+    <a:masterClrMapping/>
+  </p:clrMapOvr>
 </p:notes>
 </file>
 
 <file path=ppt/slideLayouts/slideLayout1.xml><?xml version="1.0" encoding="utf-8"?>
-<p:sldLayout xmlns:a="http://schemas.openxmlformats.org/drawingml/2006/main" xmlns:r="http://schemas.openxmlformats.org/officeDocument/2006/relationships" xmlns:p="http://schemas.openxmlformats.org/presentationml/2006/main" xmlns:m="http://schemas.openxmlformats.org/officeDocument/2006/math" xmlns:w="http://schemas.openxmlformats.org/wordprocessingml/2006/main" matchingName="" preserve="1" showMasterPhAnim="0" type="title" userDrawn="1">
+<p:sldLayout xmlns:a="http://schemas.openxmlformats.org/drawingml/2006/main" xmlns:r="http://schemas.openxmlformats.org/officeDocument/2006/relationships" xmlns:p="http://schemas.openxmlformats.org/presentationml/2006/main" showMasterPhAnim="0" type="title" preserve="1" userDrawn="1">
   <p:cSld name="Title Slide">
     <p:spTree>
       <p:nvGrpSpPr>
@@ -713,7 +762,6 @@
               <a:rPr lang="es-ES"/>
               <a:t>Click to edit Master title style</a:t>
             </a:r>
-            <a:endParaRPr lang="es-ES"/>
           </a:p>
         </p:txBody>
       </p:sp>
@@ -781,7 +829,6 @@
               <a:rPr lang="es-ES"/>
               <a:t>Click to edit Master subtitle style</a:t>
             </a:r>
-            <a:endParaRPr lang="es-ES"/>
           </a:p>
         </p:txBody>
       </p:sp>
@@ -805,7 +852,7 @@
             </a:pPr>
             <a:fld id="{BCC18F51-09EC-435C-A3BA-64A766E099C0}" type="datetimeFigureOut">
               <a:rPr lang="es-ES"/>
-              <a:t>30.10.2013</a:t>
+              <a:t>01/12/2023</a:t>
             </a:fld>
             <a:endParaRPr lang="es-ES"/>
           </a:p>
@@ -853,7 +900,7 @@
             </a:pPr>
             <a:fld id="{08395586-F03A-48D1-94DF-16B239DF4FB5}" type="slidenum">
               <a:rPr lang="es-ES"/>
-              <a:t>‹#›</a:t>
+              <a:t>‹Nº›</a:t>
             </a:fld>
             <a:endParaRPr lang="es-ES"/>
           </a:p>
@@ -868,7 +915,7 @@
 </file>
 
 <file path=ppt/slideLayouts/slideLayout10.xml><?xml version="1.0" encoding="utf-8"?>
-<p:sldLayout xmlns:a="http://schemas.openxmlformats.org/drawingml/2006/main" xmlns:r="http://schemas.openxmlformats.org/officeDocument/2006/relationships" xmlns:p="http://schemas.openxmlformats.org/presentationml/2006/main" xmlns:m="http://schemas.openxmlformats.org/officeDocument/2006/math" xmlns:w="http://schemas.openxmlformats.org/wordprocessingml/2006/main" matchingName="" preserve="1" showMasterPhAnim="0" type="vertTx" userDrawn="1">
+<p:sldLayout xmlns:a="http://schemas.openxmlformats.org/drawingml/2006/main" xmlns:r="http://schemas.openxmlformats.org/officeDocument/2006/relationships" xmlns:p="http://schemas.openxmlformats.org/presentationml/2006/main" showMasterPhAnim="0" type="vertTx" preserve="1" userDrawn="1">
   <p:cSld name="Title and Vertical Text">
     <p:spTree>
       <p:nvGrpSpPr>
@@ -906,7 +953,6 @@
               <a:rPr lang="es-ES"/>
               <a:t>Click to edit Master title style</a:t>
             </a:r>
-            <a:endParaRPr lang="es-ES"/>
           </a:p>
         </p:txBody>
       </p:sp>
@@ -972,7 +1018,6 @@
               <a:rPr lang="es-ES"/>
               <a:t>Fifth level</a:t>
             </a:r>
-            <a:endParaRPr lang="es-ES"/>
           </a:p>
         </p:txBody>
       </p:sp>
@@ -996,7 +1041,7 @@
             </a:pPr>
             <a:fld id="{BCC18F51-09EC-435C-A3BA-64A766E099C0}" type="datetimeFigureOut">
               <a:rPr lang="es-ES"/>
-              <a:t>30.10.2013</a:t>
+              <a:t>01/12/2023</a:t>
             </a:fld>
             <a:endParaRPr lang="es-ES"/>
           </a:p>
@@ -1044,7 +1089,7 @@
             </a:pPr>
             <a:fld id="{08395586-F03A-48D1-94DF-16B239DF4FB5}" type="slidenum">
               <a:rPr lang="es-ES"/>
-              <a:t>‹#›</a:t>
+              <a:t>‹Nº›</a:t>
             </a:fld>
             <a:endParaRPr lang="es-ES"/>
           </a:p>
@@ -1059,7 +1104,7 @@
 </file>
 
 <file path=ppt/slideLayouts/slideLayout11.xml><?xml version="1.0" encoding="utf-8"?>
-<p:sldLayout xmlns:a="http://schemas.openxmlformats.org/drawingml/2006/main" xmlns:r="http://schemas.openxmlformats.org/officeDocument/2006/relationships" xmlns:p="http://schemas.openxmlformats.org/presentationml/2006/main" xmlns:m="http://schemas.openxmlformats.org/officeDocument/2006/math" xmlns:w="http://schemas.openxmlformats.org/wordprocessingml/2006/main" matchingName="" preserve="1" showMasterPhAnim="0" type="vertTitleAndTx" userDrawn="1">
+<p:sldLayout xmlns:a="http://schemas.openxmlformats.org/drawingml/2006/main" xmlns:r="http://schemas.openxmlformats.org/officeDocument/2006/relationships" xmlns:p="http://schemas.openxmlformats.org/presentationml/2006/main" showMasterPhAnim="0" type="vertTitleAndTx" preserve="1" userDrawn="1">
   <p:cSld name="Vertical Title and Text">
     <p:spTree>
       <p:nvGrpSpPr>
@@ -1102,7 +1147,6 @@
               <a:rPr lang="es-ES"/>
               <a:t>Click to edit Master title style</a:t>
             </a:r>
-            <a:endParaRPr lang="es-ES"/>
           </a:p>
         </p:txBody>
       </p:sp>
@@ -1173,7 +1217,6 @@
               <a:rPr lang="es-ES"/>
               <a:t>Fifth level</a:t>
             </a:r>
-            <a:endParaRPr lang="es-ES"/>
           </a:p>
         </p:txBody>
       </p:sp>
@@ -1197,7 +1240,7 @@
             </a:pPr>
             <a:fld id="{BCC18F51-09EC-435C-A3BA-64A766E099C0}" type="datetimeFigureOut">
               <a:rPr lang="es-ES"/>
-              <a:t>30.10.2013</a:t>
+              <a:t>01/12/2023</a:t>
             </a:fld>
             <a:endParaRPr lang="es-ES"/>
           </a:p>
@@ -1245,7 +1288,7 @@
             </a:pPr>
             <a:fld id="{08395586-F03A-48D1-94DF-16B239DF4FB5}" type="slidenum">
               <a:rPr lang="es-ES"/>
-              <a:t>‹#›</a:t>
+              <a:t>‹Nº›</a:t>
             </a:fld>
             <a:endParaRPr lang="es-ES"/>
           </a:p>
@@ -1260,7 +1303,7 @@
 </file>
 
 <file path=ppt/slideLayouts/slideLayout2.xml><?xml version="1.0" encoding="utf-8"?>
-<p:sldLayout xmlns:a="http://schemas.openxmlformats.org/drawingml/2006/main" xmlns:r="http://schemas.openxmlformats.org/officeDocument/2006/relationships" xmlns:p="http://schemas.openxmlformats.org/presentationml/2006/main" xmlns:m="http://schemas.openxmlformats.org/officeDocument/2006/math" xmlns:w="http://schemas.openxmlformats.org/wordprocessingml/2006/main" matchingName="" preserve="1" showMasterPhAnim="0" type="obj" userDrawn="1">
+<p:sldLayout xmlns:a="http://schemas.openxmlformats.org/drawingml/2006/main" xmlns:r="http://schemas.openxmlformats.org/officeDocument/2006/relationships" xmlns:p="http://schemas.openxmlformats.org/presentationml/2006/main" showMasterPhAnim="0" type="obj" preserve="1" userDrawn="1">
   <p:cSld name="Title and Content">
     <p:spTree>
       <p:nvGrpSpPr>
@@ -1298,7 +1341,6 @@
               <a:rPr lang="es-ES"/>
               <a:t>Click to edit Master title style</a:t>
             </a:r>
-            <a:endParaRPr lang="es-ES"/>
           </a:p>
         </p:txBody>
       </p:sp>
@@ -1364,7 +1406,6 @@
               <a:rPr lang="es-ES"/>
               <a:t>Fifth level</a:t>
             </a:r>
-            <a:endParaRPr lang="es-ES"/>
           </a:p>
         </p:txBody>
       </p:sp>
@@ -1388,7 +1429,7 @@
             </a:pPr>
             <a:fld id="{BCC18F51-09EC-435C-A3BA-64A766E099C0}" type="datetimeFigureOut">
               <a:rPr lang="es-ES"/>
-              <a:t>30.10.2013</a:t>
+              <a:t>01/12/2023</a:t>
             </a:fld>
             <a:endParaRPr lang="es-ES"/>
           </a:p>
@@ -1436,7 +1477,7 @@
             </a:pPr>
             <a:fld id="{08395586-F03A-48D1-94DF-16B239DF4FB5}" type="slidenum">
               <a:rPr lang="es-ES"/>
-              <a:t>‹#›</a:t>
+              <a:t>‹Nº›</a:t>
             </a:fld>
             <a:endParaRPr lang="es-ES"/>
           </a:p>
@@ -1451,7 +1492,7 @@
 </file>
 
 <file path=ppt/slideLayouts/slideLayout3.xml><?xml version="1.0" encoding="utf-8"?>
-<p:sldLayout xmlns:a="http://schemas.openxmlformats.org/drawingml/2006/main" xmlns:r="http://schemas.openxmlformats.org/officeDocument/2006/relationships" xmlns:p="http://schemas.openxmlformats.org/presentationml/2006/main" xmlns:m="http://schemas.openxmlformats.org/officeDocument/2006/math" xmlns:w="http://schemas.openxmlformats.org/wordprocessingml/2006/main" matchingName="" preserve="1" showMasterPhAnim="0" type="secHead" userDrawn="1">
+<p:sldLayout xmlns:a="http://schemas.openxmlformats.org/drawingml/2006/main" xmlns:r="http://schemas.openxmlformats.org/officeDocument/2006/relationships" xmlns:p="http://schemas.openxmlformats.org/presentationml/2006/main" showMasterPhAnim="0" type="secHead" preserve="1" userDrawn="1">
   <p:cSld name="Section Header">
     <p:spTree>
       <p:nvGrpSpPr>
@@ -1498,7 +1539,6 @@
               <a:rPr lang="es-ES"/>
               <a:t>Click to edit Master title style</a:t>
             </a:r>
-            <a:endParaRPr lang="es-ES"/>
           </a:p>
         </p:txBody>
       </p:sp>
@@ -1644,7 +1684,7 @@
             </a:pPr>
             <a:fld id="{BCC18F51-09EC-435C-A3BA-64A766E099C0}" type="datetimeFigureOut">
               <a:rPr lang="es-ES"/>
-              <a:t>30.10.2013</a:t>
+              <a:t>01/12/2023</a:t>
             </a:fld>
             <a:endParaRPr lang="es-ES"/>
           </a:p>
@@ -1692,7 +1732,7 @@
             </a:pPr>
             <a:fld id="{08395586-F03A-48D1-94DF-16B239DF4FB5}" type="slidenum">
               <a:rPr lang="es-ES"/>
-              <a:t>‹#›</a:t>
+              <a:t>‹Nº›</a:t>
             </a:fld>
             <a:endParaRPr lang="es-ES"/>
           </a:p>
@@ -1707,7 +1747,7 @@
 </file>
 
 <file path=ppt/slideLayouts/slideLayout4.xml><?xml version="1.0" encoding="utf-8"?>
-<p:sldLayout xmlns:a="http://schemas.openxmlformats.org/drawingml/2006/main" xmlns:r="http://schemas.openxmlformats.org/officeDocument/2006/relationships" xmlns:p="http://schemas.openxmlformats.org/presentationml/2006/main" xmlns:m="http://schemas.openxmlformats.org/officeDocument/2006/math" xmlns:w="http://schemas.openxmlformats.org/wordprocessingml/2006/main" matchingName="" preserve="1" showMasterPhAnim="0" type="twoObj" userDrawn="1">
+<p:sldLayout xmlns:a="http://schemas.openxmlformats.org/drawingml/2006/main" xmlns:r="http://schemas.openxmlformats.org/officeDocument/2006/relationships" xmlns:p="http://schemas.openxmlformats.org/presentationml/2006/main" showMasterPhAnim="0" type="twoObj" preserve="1" userDrawn="1">
   <p:cSld name="Two Content">
     <p:spTree>
       <p:nvGrpSpPr>
@@ -1745,7 +1785,6 @@
               <a:rPr lang="es-ES"/>
               <a:t>Click to edit Master title style</a:t>
             </a:r>
-            <a:endParaRPr lang="es-ES"/>
           </a:p>
         </p:txBody>
       </p:sp>
@@ -1816,7 +1855,6 @@
               <a:rPr lang="es-ES"/>
               <a:t>Fifth level</a:t>
             </a:r>
-            <a:endParaRPr lang="es-ES"/>
           </a:p>
         </p:txBody>
       </p:sp>
@@ -1887,7 +1925,6 @@
               <a:rPr lang="es-ES"/>
               <a:t>Fifth level</a:t>
             </a:r>
-            <a:endParaRPr lang="es-ES"/>
           </a:p>
         </p:txBody>
       </p:sp>
@@ -1911,7 +1948,7 @@
             </a:pPr>
             <a:fld id="{BCC18F51-09EC-435C-A3BA-64A766E099C0}" type="datetimeFigureOut">
               <a:rPr lang="es-ES"/>
-              <a:t>30.10.2013</a:t>
+              <a:t>01/12/2023</a:t>
             </a:fld>
             <a:endParaRPr lang="es-ES"/>
           </a:p>
@@ -1959,7 +1996,7 @@
             </a:pPr>
             <a:fld id="{08395586-F03A-48D1-94DF-16B239DF4FB5}" type="slidenum">
               <a:rPr lang="es-ES"/>
-              <a:t>‹#›</a:t>
+              <a:t>‹Nº›</a:t>
             </a:fld>
             <a:endParaRPr lang="es-ES"/>
           </a:p>
@@ -1974,7 +2011,7 @@
 </file>
 
 <file path=ppt/slideLayouts/slideLayout5.xml><?xml version="1.0" encoding="utf-8"?>
-<p:sldLayout xmlns:a="http://schemas.openxmlformats.org/drawingml/2006/main" xmlns:r="http://schemas.openxmlformats.org/officeDocument/2006/relationships" xmlns:p="http://schemas.openxmlformats.org/presentationml/2006/main" xmlns:m="http://schemas.openxmlformats.org/officeDocument/2006/math" xmlns:w="http://schemas.openxmlformats.org/wordprocessingml/2006/main" matchingName="" preserve="1" showMasterPhAnim="0" type="twoTxTwoObj" userDrawn="1">
+<p:sldLayout xmlns:a="http://schemas.openxmlformats.org/drawingml/2006/main" xmlns:r="http://schemas.openxmlformats.org/officeDocument/2006/relationships" xmlns:p="http://schemas.openxmlformats.org/presentationml/2006/main" showMasterPhAnim="0" type="twoTxTwoObj" preserve="1" userDrawn="1">
   <p:cSld name="Comparison">
     <p:spTree>
       <p:nvGrpSpPr>
@@ -2017,7 +2054,6 @@
               <a:rPr lang="es-ES"/>
               <a:t>Click to edit Master title style</a:t>
             </a:r>
-            <a:endParaRPr lang="es-ES"/>
           </a:p>
         </p:txBody>
       </p:sp>
@@ -2156,7 +2192,6 @@
               <a:rPr lang="es-ES"/>
               <a:t>Fifth level</a:t>
             </a:r>
-            <a:endParaRPr lang="es-ES"/>
           </a:p>
         </p:txBody>
       </p:sp>
@@ -2295,7 +2330,6 @@
               <a:rPr lang="es-ES"/>
               <a:t>Fifth level</a:t>
             </a:r>
-            <a:endParaRPr lang="es-ES"/>
           </a:p>
         </p:txBody>
       </p:sp>
@@ -2319,7 +2353,7 @@
             </a:pPr>
             <a:fld id="{BCC18F51-09EC-435C-A3BA-64A766E099C0}" type="datetimeFigureOut">
               <a:rPr lang="es-ES"/>
-              <a:t>30.10.2013</a:t>
+              <a:t>01/12/2023</a:t>
             </a:fld>
             <a:endParaRPr lang="es-ES"/>
           </a:p>
@@ -2367,7 +2401,7 @@
             </a:pPr>
             <a:fld id="{08395586-F03A-48D1-94DF-16B239DF4FB5}" type="slidenum">
               <a:rPr lang="es-ES"/>
-              <a:t>‹#›</a:t>
+              <a:t>‹Nº›</a:t>
             </a:fld>
             <a:endParaRPr lang="es-ES"/>
           </a:p>
@@ -2382,7 +2416,7 @@
 </file>
 
 <file path=ppt/slideLayouts/slideLayout6.xml><?xml version="1.0" encoding="utf-8"?>
-<p:sldLayout xmlns:a="http://schemas.openxmlformats.org/drawingml/2006/main" xmlns:r="http://schemas.openxmlformats.org/officeDocument/2006/relationships" xmlns:p="http://schemas.openxmlformats.org/presentationml/2006/main" xmlns:m="http://schemas.openxmlformats.org/officeDocument/2006/math" xmlns:w="http://schemas.openxmlformats.org/wordprocessingml/2006/main" matchingName="" preserve="1" showMasterPhAnim="0" type="titleOnly" userDrawn="1">
+<p:sldLayout xmlns:a="http://schemas.openxmlformats.org/drawingml/2006/main" xmlns:r="http://schemas.openxmlformats.org/officeDocument/2006/relationships" xmlns:p="http://schemas.openxmlformats.org/presentationml/2006/main" showMasterPhAnim="0" type="titleOnly" preserve="1" userDrawn="1">
   <p:cSld name="Title Only">
     <p:spTree>
       <p:nvGrpSpPr>
@@ -2420,7 +2454,6 @@
               <a:rPr lang="es-ES"/>
               <a:t>Click to edit Master title style</a:t>
             </a:r>
-            <a:endParaRPr lang="es-ES"/>
           </a:p>
         </p:txBody>
       </p:sp>
@@ -2444,7 +2477,7 @@
             </a:pPr>
             <a:fld id="{BCC18F51-09EC-435C-A3BA-64A766E099C0}" type="datetimeFigureOut">
               <a:rPr lang="es-ES"/>
-              <a:t>30.10.2013</a:t>
+              <a:t>01/12/2023</a:t>
             </a:fld>
             <a:endParaRPr lang="es-ES"/>
           </a:p>
@@ -2492,7 +2525,7 @@
             </a:pPr>
             <a:fld id="{08395586-F03A-48D1-94DF-16B239DF4FB5}" type="slidenum">
               <a:rPr lang="es-ES"/>
-              <a:t>‹#›</a:t>
+              <a:t>‹Nº›</a:t>
             </a:fld>
             <a:endParaRPr lang="es-ES"/>
           </a:p>
@@ -2507,7 +2540,7 @@
 </file>
 
 <file path=ppt/slideLayouts/slideLayout7.xml><?xml version="1.0" encoding="utf-8"?>
-<p:sldLayout xmlns:a="http://schemas.openxmlformats.org/drawingml/2006/main" xmlns:r="http://schemas.openxmlformats.org/officeDocument/2006/relationships" xmlns:p="http://schemas.openxmlformats.org/presentationml/2006/main" xmlns:m="http://schemas.openxmlformats.org/officeDocument/2006/math" xmlns:w="http://schemas.openxmlformats.org/wordprocessingml/2006/main" matchingName="" preserve="1" showMasterPhAnim="0" type="blank" userDrawn="1">
+<p:sldLayout xmlns:a="http://schemas.openxmlformats.org/drawingml/2006/main" xmlns:r="http://schemas.openxmlformats.org/officeDocument/2006/relationships" xmlns:p="http://schemas.openxmlformats.org/presentationml/2006/main" showMasterPhAnim="0" type="blank" preserve="1" userDrawn="1">
   <p:cSld name="Blank">
     <p:spTree>
       <p:nvGrpSpPr>
@@ -2543,7 +2576,7 @@
             </a:pPr>
             <a:fld id="{BCC18F51-09EC-435C-A3BA-64A766E099C0}" type="datetimeFigureOut">
               <a:rPr lang="es-ES"/>
-              <a:t>30.10.2013</a:t>
+              <a:t>01/12/2023</a:t>
             </a:fld>
             <a:endParaRPr lang="es-ES"/>
           </a:p>
@@ -2591,7 +2624,7 @@
             </a:pPr>
             <a:fld id="{08395586-F03A-48D1-94DF-16B239DF4FB5}" type="slidenum">
               <a:rPr lang="es-ES"/>
-              <a:t>‹#›</a:t>
+              <a:t>‹Nº›</a:t>
             </a:fld>
             <a:endParaRPr lang="es-ES"/>
           </a:p>
@@ -2606,7 +2639,7 @@
 </file>
 
 <file path=ppt/slideLayouts/slideLayout8.xml><?xml version="1.0" encoding="utf-8"?>
-<p:sldLayout xmlns:a="http://schemas.openxmlformats.org/drawingml/2006/main" xmlns:r="http://schemas.openxmlformats.org/officeDocument/2006/relationships" xmlns:p="http://schemas.openxmlformats.org/presentationml/2006/main" xmlns:m="http://schemas.openxmlformats.org/officeDocument/2006/math" xmlns:w="http://schemas.openxmlformats.org/wordprocessingml/2006/main" matchingName="" preserve="1" showMasterPhAnim="0" type="objTx" userDrawn="1">
+<p:sldLayout xmlns:a="http://schemas.openxmlformats.org/drawingml/2006/main" xmlns:r="http://schemas.openxmlformats.org/officeDocument/2006/relationships" xmlns:p="http://schemas.openxmlformats.org/presentationml/2006/main" showMasterPhAnim="0" type="objTx" preserve="1" userDrawn="1">
   <p:cSld name="Content with Caption">
     <p:spTree>
       <p:nvGrpSpPr>
@@ -2653,7 +2686,6 @@
               <a:rPr lang="es-ES"/>
               <a:t>Click to edit Master title style</a:t>
             </a:r>
-            <a:endParaRPr lang="es-ES"/>
           </a:p>
         </p:txBody>
       </p:sp>
@@ -2752,7 +2784,6 @@
               <a:rPr lang="es-ES"/>
               <a:t>Fifth level</a:t>
             </a:r>
-            <a:endParaRPr lang="es-ES"/>
           </a:p>
         </p:txBody>
       </p:sp>
@@ -2844,7 +2875,7 @@
             </a:pPr>
             <a:fld id="{BCC18F51-09EC-435C-A3BA-64A766E099C0}" type="datetimeFigureOut">
               <a:rPr lang="es-ES"/>
-              <a:t>30.10.2013</a:t>
+              <a:t>01/12/2023</a:t>
             </a:fld>
             <a:endParaRPr lang="es-ES"/>
           </a:p>
@@ -2892,7 +2923,7 @@
             </a:pPr>
             <a:fld id="{08395586-F03A-48D1-94DF-16B239DF4FB5}" type="slidenum">
               <a:rPr lang="es-ES"/>
-              <a:t>‹#›</a:t>
+              <a:t>‹Nº›</a:t>
             </a:fld>
             <a:endParaRPr lang="es-ES"/>
           </a:p>
@@ -2907,7 +2938,7 @@
 </file>
 
 <file path=ppt/slideLayouts/slideLayout9.xml><?xml version="1.0" encoding="utf-8"?>
-<p:sldLayout xmlns:a="http://schemas.openxmlformats.org/drawingml/2006/main" xmlns:r="http://schemas.openxmlformats.org/officeDocument/2006/relationships" xmlns:p="http://schemas.openxmlformats.org/presentationml/2006/main" xmlns:m="http://schemas.openxmlformats.org/officeDocument/2006/math" xmlns:w="http://schemas.openxmlformats.org/wordprocessingml/2006/main" matchingName="" preserve="1" showMasterPhAnim="0" type="picTx" userDrawn="1">
+<p:sldLayout xmlns:a="http://schemas.openxmlformats.org/drawingml/2006/main" xmlns:r="http://schemas.openxmlformats.org/officeDocument/2006/relationships" xmlns:p="http://schemas.openxmlformats.org/presentationml/2006/main" showMasterPhAnim="0" type="picTx" preserve="1" userDrawn="1">
   <p:cSld name="Picture with Caption">
     <p:spTree>
       <p:nvGrpSpPr>
@@ -2954,7 +2985,6 @@
               <a:rPr lang="es-ES"/>
               <a:t>Click to edit Master title style</a:t>
             </a:r>
-            <a:endParaRPr lang="es-ES"/>
           </a:p>
         </p:txBody>
       </p:sp>
@@ -2962,7 +2992,7 @@
         <p:nvSpPr>
           <p:cNvPr id="3" name="Picture Placeholder 2"/>
           <p:cNvSpPr>
-            <a:spLocks noChangeAspect="1" noGrp="1"/>
+            <a:spLocks noGrp="1" noChangeAspect="1"/>
           </p:cNvSpPr>
           <p:nvPr>
             <p:ph type="pic" idx="1"/>
@@ -3022,7 +3052,6 @@
               <a:rPr lang="es-ES"/>
               <a:t>Click icon to add picture</a:t>
             </a:r>
-            <a:endParaRPr lang="es-ES"/>
           </a:p>
         </p:txBody>
       </p:sp>
@@ -3114,7 +3143,7 @@
             </a:pPr>
             <a:fld id="{BCC18F51-09EC-435C-A3BA-64A766E099C0}" type="datetimeFigureOut">
               <a:rPr lang="es-ES"/>
-              <a:t>30.10.2013</a:t>
+              <a:t>01/12/2023</a:t>
             </a:fld>
             <a:endParaRPr lang="es-ES"/>
           </a:p>
@@ -3162,7 +3191,7 @@
             </a:pPr>
             <a:fld id="{08395586-F03A-48D1-94DF-16B239DF4FB5}" type="slidenum">
               <a:rPr lang="es-ES"/>
-              <a:t>‹#›</a:t>
+              <a:t>‹Nº›</a:t>
             </a:fld>
             <a:endParaRPr lang="es-ES"/>
           </a:p>
@@ -3177,8 +3206,8 @@
 </file>
 
 <file path=ppt/slideMasters/slideMaster1.xml><?xml version="1.0" encoding="utf-8"?>
-<p:sldMaster xmlns:a="http://schemas.openxmlformats.org/drawingml/2006/main" xmlns:r="http://schemas.openxmlformats.org/officeDocument/2006/relationships" xmlns:p="http://schemas.openxmlformats.org/presentationml/2006/main" xmlns:m="http://schemas.openxmlformats.org/officeDocument/2006/math" xmlns:w="http://schemas.openxmlformats.org/wordprocessingml/2006/main" preserve="0">
-  <p:cSld name="">
+<p:sldMaster xmlns:a="http://schemas.openxmlformats.org/drawingml/2006/main" xmlns:r="http://schemas.openxmlformats.org/officeDocument/2006/relationships" xmlns:p="http://schemas.openxmlformats.org/presentationml/2006/main">
+  <p:cSld>
     <p:bg>
       <p:bgRef idx="1001">
         <a:schemeClr val="bg1"/>
@@ -3230,7 +3259,6 @@
               <a:rPr lang="es-ES"/>
               <a:t>Click to edit Master title style</a:t>
             </a:r>
-            <a:endParaRPr lang="es-ES"/>
           </a:p>
         </p:txBody>
       </p:sp>
@@ -3306,7 +3334,6 @@
               <a:rPr lang="es-ES"/>
               <a:t>Fifth level</a:t>
             </a:r>
-            <a:endParaRPr lang="es-ES"/>
           </a:p>
         </p:txBody>
       </p:sp>
@@ -3348,7 +3375,7 @@
             </a:pPr>
             <a:fld id="{BCC18F51-09EC-435C-A3BA-64A766E099C0}" type="datetimeFigureOut">
               <a:rPr lang="es-ES"/>
-              <a:t>30.10.2013</a:t>
+              <a:t>01/12/2023</a:t>
             </a:fld>
             <a:endParaRPr lang="es-ES"/>
           </a:p>
@@ -3432,7 +3459,7 @@
             </a:pPr>
             <a:fld id="{08395586-F03A-48D1-94DF-16B239DF4FB5}" type="slidenum">
               <a:rPr lang="es-ES"/>
-              <a:t>‹#›</a:t>
+              <a:t>‹Nº›</a:t>
             </a:fld>
             <a:endParaRPr lang="es-ES"/>
           </a:p>
@@ -3738,8 +3765,8 @@
 </file>
 
 <file path=ppt/slides/slide1.xml><?xml version="1.0" encoding="utf-8"?>
-<p:sld xmlns:a="http://schemas.openxmlformats.org/drawingml/2006/main" xmlns:r="http://schemas.openxmlformats.org/officeDocument/2006/relationships" xmlns:p="http://schemas.openxmlformats.org/presentationml/2006/main" xmlns:m="http://schemas.openxmlformats.org/officeDocument/2006/math" xmlns:w="http://schemas.openxmlformats.org/wordprocessingml/2006/main" showMasterPhAnim="0" show="1">
-  <p:cSld name="">
+<p:sld xmlns:a="http://schemas.openxmlformats.org/drawingml/2006/main" xmlns:r="http://schemas.openxmlformats.org/officeDocument/2006/relationships" xmlns:p="http://schemas.openxmlformats.org/presentationml/2006/main" showMasterPhAnim="0">
+  <p:cSld>
     <p:spTree>
       <p:nvGrpSpPr>
         <p:cNvPr id="1" name=""/>
@@ -3774,7 +3801,7 @@
             </a:pPr>
             <a:fld id="{7922A316-3D4D-A143-4925-0B9ED24540EC}" type="slidenum">
               <a:rPr lang="es-ES"/>
-              <a:t/>
+              <a:t>1</a:t>
             </a:fld>
             <a:endParaRPr/>
           </a:p>
@@ -3782,7 +3809,7 @@
       </p:sp>
       <p:pic>
         <p:nvPicPr>
-          <p:cNvPr id="664657258" name=""/>
+          <p:cNvPr id="664657258" name="Imagen 664657257"/>
           <p:cNvPicPr>
             <a:picLocks noChangeAspect="1"/>
           </p:cNvPicPr>
@@ -3807,20 +3834,672 @@
   <p:clrMapOvr>
     <a:masterClrMapping/>
   </p:clrMapOvr>
-  <mc:AlternateContent xmlns:mc="http://schemas.openxmlformats.org/markup-compatibility/2006">
-    <mc:Choice xmlns:p159="http://schemas.microsoft.com/office/powerpoint/2015/09/main" xmlns:p14="http://schemas.microsoft.com/office/powerpoint/2010/main" Requires="p159">
-      <p:transition p14:dur="2000" advClick="1"/>
-    </mc:Choice>
-    <mc:Fallback>
-      <p:transition advClick="1"/>
-    </mc:Fallback>
-  </mc:AlternateContent>
+</p:sld>
+</file>
+
+<file path=ppt/slides/slide10.xml><?xml version="1.0" encoding="utf-8"?>
+<p:sld xmlns:a="http://schemas.openxmlformats.org/drawingml/2006/main" xmlns:r="http://schemas.openxmlformats.org/officeDocument/2006/relationships" xmlns:p="http://schemas.openxmlformats.org/presentationml/2006/main">
+  <p:cSld>
+    <p:spTree>
+      <p:nvGrpSpPr>
+        <p:cNvPr id="1" name=""/>
+        <p:cNvGrpSpPr/>
+        <p:nvPr/>
+      </p:nvGrpSpPr>
+      <p:grpSpPr>
+        <a:xfrm>
+          <a:off x="0" y="0"/>
+          <a:ext cx="0" cy="0"/>
+          <a:chOff x="0" y="0"/>
+          <a:chExt cx="0" cy="0"/>
+        </a:xfrm>
+      </p:grpSpPr>
+      <p:pic>
+        <p:nvPicPr>
+          <p:cNvPr id="2" name="Imagen 1" descr="Imagen que contiene Icono&#10;&#10;Descripción generada automáticamente">
+            <a:extLst>
+              <a:ext uri="{FF2B5EF4-FFF2-40B4-BE49-F238E27FC236}">
+                <a16:creationId xmlns:a16="http://schemas.microsoft.com/office/drawing/2014/main" id="{DA6372CB-2000-0567-7FC6-DAE631FB8105}"/>
+              </a:ext>
+            </a:extLst>
+          </p:cNvPr>
+          <p:cNvPicPr>
+            <a:picLocks noChangeAspect="1"/>
+          </p:cNvPicPr>
+          <p:nvPr/>
+        </p:nvPicPr>
+        <p:blipFill>
+          <a:blip r:embed="rId2">
+            <a:extLst>
+              <a:ext uri="{28A0092B-C50C-407E-A947-70E740481C1C}">
+                <a14:useLocalDpi xmlns:a14="http://schemas.microsoft.com/office/drawing/2010/main" val="0"/>
+              </a:ext>
+            </a:extLst>
+          </a:blip>
+          <a:stretch>
+            <a:fillRect/>
+          </a:stretch>
+        </p:blipFill>
+        <p:spPr>
+          <a:xfrm>
+            <a:off x="3714750" y="1047750"/>
+            <a:ext cx="4762500" cy="4762500"/>
+          </a:xfrm>
+          <a:prstGeom prst="rect">
+            <a:avLst/>
+          </a:prstGeom>
+        </p:spPr>
+      </p:pic>
+    </p:spTree>
+    <p:extLst>
+      <p:ext uri="{BB962C8B-B14F-4D97-AF65-F5344CB8AC3E}">
+        <p14:creationId xmlns:p14="http://schemas.microsoft.com/office/powerpoint/2010/main" val="3357839204"/>
+      </p:ext>
+    </p:extLst>
+  </p:cSld>
+  <p:clrMapOvr>
+    <a:masterClrMapping/>
+  </p:clrMapOvr>
+</p:sld>
+</file>
+
+<file path=ppt/slides/slide11.xml><?xml version="1.0" encoding="utf-8"?>
+<p:sld xmlns:a="http://schemas.openxmlformats.org/drawingml/2006/main" xmlns:r="http://schemas.openxmlformats.org/officeDocument/2006/relationships" xmlns:p="http://schemas.openxmlformats.org/presentationml/2006/main">
+  <p:cSld>
+    <p:spTree>
+      <p:nvGrpSpPr>
+        <p:cNvPr id="1" name=""/>
+        <p:cNvGrpSpPr/>
+        <p:nvPr/>
+      </p:nvGrpSpPr>
+      <p:grpSpPr>
+        <a:xfrm>
+          <a:off x="0" y="0"/>
+          <a:ext cx="0" cy="0"/>
+          <a:chOff x="0" y="0"/>
+          <a:chExt cx="0" cy="0"/>
+        </a:xfrm>
+      </p:grpSpPr>
+      <p:pic>
+        <p:nvPicPr>
+          <p:cNvPr id="2" name="Imagen 1" descr="Un dibujo de una persona&#10;&#10;Descripción generada automáticamente con confianza media">
+            <a:extLst>
+              <a:ext uri="{FF2B5EF4-FFF2-40B4-BE49-F238E27FC236}">
+                <a16:creationId xmlns:a16="http://schemas.microsoft.com/office/drawing/2014/main" id="{9364BEA8-864E-D3B1-E4F2-DD9958EF4180}"/>
+              </a:ext>
+            </a:extLst>
+          </p:cNvPr>
+          <p:cNvPicPr>
+            <a:picLocks noChangeAspect="1"/>
+          </p:cNvPicPr>
+          <p:nvPr/>
+        </p:nvPicPr>
+        <p:blipFill>
+          <a:blip r:embed="rId2">
+            <a:extLst>
+              <a:ext uri="{28A0092B-C50C-407E-A947-70E740481C1C}">
+                <a14:useLocalDpi xmlns:a14="http://schemas.microsoft.com/office/drawing/2010/main" val="0"/>
+              </a:ext>
+            </a:extLst>
+          </a:blip>
+          <a:stretch>
+            <a:fillRect/>
+          </a:stretch>
+        </p:blipFill>
+        <p:spPr>
+          <a:xfrm>
+            <a:off x="3714750" y="1047750"/>
+            <a:ext cx="4762500" cy="4762500"/>
+          </a:xfrm>
+          <a:prstGeom prst="rect">
+            <a:avLst/>
+          </a:prstGeom>
+        </p:spPr>
+      </p:pic>
+    </p:spTree>
+    <p:extLst>
+      <p:ext uri="{BB962C8B-B14F-4D97-AF65-F5344CB8AC3E}">
+        <p14:creationId xmlns:p14="http://schemas.microsoft.com/office/powerpoint/2010/main" val="10122730"/>
+      </p:ext>
+    </p:extLst>
+  </p:cSld>
+  <p:clrMapOvr>
+    <a:masterClrMapping/>
+  </p:clrMapOvr>
+</p:sld>
+</file>
+
+<file path=ppt/slides/slide12.xml><?xml version="1.0" encoding="utf-8"?>
+<p:sld xmlns:a="http://schemas.openxmlformats.org/drawingml/2006/main" xmlns:r="http://schemas.openxmlformats.org/officeDocument/2006/relationships" xmlns:p="http://schemas.openxmlformats.org/presentationml/2006/main">
+  <p:cSld>
+    <p:spTree>
+      <p:nvGrpSpPr>
+        <p:cNvPr id="1" name=""/>
+        <p:cNvGrpSpPr/>
+        <p:nvPr/>
+      </p:nvGrpSpPr>
+      <p:grpSpPr>
+        <a:xfrm>
+          <a:off x="0" y="0"/>
+          <a:ext cx="0" cy="0"/>
+          <a:chOff x="0" y="0"/>
+          <a:chExt cx="0" cy="0"/>
+        </a:xfrm>
+      </p:grpSpPr>
+      <p:pic>
+        <p:nvPicPr>
+          <p:cNvPr id="2" name="Imagen 1" descr="Forma&#10;&#10;Descripción generada automáticamente con confianza baja">
+            <a:extLst>
+              <a:ext uri="{FF2B5EF4-FFF2-40B4-BE49-F238E27FC236}">
+                <a16:creationId xmlns:a16="http://schemas.microsoft.com/office/drawing/2014/main" id="{165D4B4C-022C-5BE4-AAEF-FC26B81EC050}"/>
+              </a:ext>
+            </a:extLst>
+          </p:cNvPr>
+          <p:cNvPicPr>
+            <a:picLocks noChangeAspect="1"/>
+          </p:cNvPicPr>
+          <p:nvPr/>
+        </p:nvPicPr>
+        <p:blipFill>
+          <a:blip r:embed="rId2">
+            <a:extLst>
+              <a:ext uri="{28A0092B-C50C-407E-A947-70E740481C1C}">
+                <a14:useLocalDpi xmlns:a14="http://schemas.microsoft.com/office/drawing/2010/main" val="0"/>
+              </a:ext>
+            </a:extLst>
+          </a:blip>
+          <a:stretch>
+            <a:fillRect/>
+          </a:stretch>
+        </p:blipFill>
+        <p:spPr>
+          <a:xfrm>
+            <a:off x="3714750" y="1047750"/>
+            <a:ext cx="4762500" cy="4762500"/>
+          </a:xfrm>
+          <a:prstGeom prst="rect">
+            <a:avLst/>
+          </a:prstGeom>
+        </p:spPr>
+      </p:pic>
+    </p:spTree>
+    <p:extLst>
+      <p:ext uri="{BB962C8B-B14F-4D97-AF65-F5344CB8AC3E}">
+        <p14:creationId xmlns:p14="http://schemas.microsoft.com/office/powerpoint/2010/main" val="3335919272"/>
+      </p:ext>
+    </p:extLst>
+  </p:cSld>
+  <p:clrMapOvr>
+    <a:masterClrMapping/>
+  </p:clrMapOvr>
+</p:sld>
+</file>
+
+<file path=ppt/slides/slide13.xml><?xml version="1.0" encoding="utf-8"?>
+<p:sld xmlns:a="http://schemas.openxmlformats.org/drawingml/2006/main" xmlns:r="http://schemas.openxmlformats.org/officeDocument/2006/relationships" xmlns:p="http://schemas.openxmlformats.org/presentationml/2006/main">
+  <p:cSld>
+    <p:spTree>
+      <p:nvGrpSpPr>
+        <p:cNvPr id="1" name=""/>
+        <p:cNvGrpSpPr/>
+        <p:nvPr/>
+      </p:nvGrpSpPr>
+      <p:grpSpPr>
+        <a:xfrm>
+          <a:off x="0" y="0"/>
+          <a:ext cx="0" cy="0"/>
+          <a:chOff x="0" y="0"/>
+          <a:chExt cx="0" cy="0"/>
+        </a:xfrm>
+      </p:grpSpPr>
+      <p:pic>
+        <p:nvPicPr>
+          <p:cNvPr id="2" name="Imagen 1" descr="Texto&#10;&#10;Descripción generada automáticamente con confianza baja">
+            <a:extLst>
+              <a:ext uri="{FF2B5EF4-FFF2-40B4-BE49-F238E27FC236}">
+                <a16:creationId xmlns:a16="http://schemas.microsoft.com/office/drawing/2014/main" id="{3D1D4A16-8663-B246-3EEB-8B38C128099F}"/>
+              </a:ext>
+            </a:extLst>
+          </p:cNvPr>
+          <p:cNvPicPr>
+            <a:picLocks noChangeAspect="1"/>
+          </p:cNvPicPr>
+          <p:nvPr/>
+        </p:nvPicPr>
+        <p:blipFill>
+          <a:blip r:embed="rId2">
+            <a:extLst>
+              <a:ext uri="{28A0092B-C50C-407E-A947-70E740481C1C}">
+                <a14:useLocalDpi xmlns:a14="http://schemas.microsoft.com/office/drawing/2010/main" val="0"/>
+              </a:ext>
+            </a:extLst>
+          </a:blip>
+          <a:stretch>
+            <a:fillRect/>
+          </a:stretch>
+        </p:blipFill>
+        <p:spPr>
+          <a:xfrm>
+            <a:off x="3714750" y="1047750"/>
+            <a:ext cx="4762500" cy="4762500"/>
+          </a:xfrm>
+          <a:prstGeom prst="rect">
+            <a:avLst/>
+          </a:prstGeom>
+        </p:spPr>
+      </p:pic>
+    </p:spTree>
+    <p:extLst>
+      <p:ext uri="{BB962C8B-B14F-4D97-AF65-F5344CB8AC3E}">
+        <p14:creationId xmlns:p14="http://schemas.microsoft.com/office/powerpoint/2010/main" val="3426147486"/>
+      </p:ext>
+    </p:extLst>
+  </p:cSld>
+  <p:clrMapOvr>
+    <a:masterClrMapping/>
+  </p:clrMapOvr>
+</p:sld>
+</file>
+
+<file path=ppt/slides/slide14.xml><?xml version="1.0" encoding="utf-8"?>
+<p:sld xmlns:a="http://schemas.openxmlformats.org/drawingml/2006/main" xmlns:r="http://schemas.openxmlformats.org/officeDocument/2006/relationships" xmlns:p="http://schemas.openxmlformats.org/presentationml/2006/main">
+  <p:cSld>
+    <p:spTree>
+      <p:nvGrpSpPr>
+        <p:cNvPr id="1" name=""/>
+        <p:cNvGrpSpPr/>
+        <p:nvPr/>
+      </p:nvGrpSpPr>
+      <p:grpSpPr>
+        <a:xfrm>
+          <a:off x="0" y="0"/>
+          <a:ext cx="0" cy="0"/>
+          <a:chOff x="0" y="0"/>
+          <a:chExt cx="0" cy="0"/>
+        </a:xfrm>
+      </p:grpSpPr>
+      <p:pic>
+        <p:nvPicPr>
+          <p:cNvPr id="2" name="Imagen 1" descr="Icono&#10;&#10;Descripción generada automáticamente">
+            <a:extLst>
+              <a:ext uri="{FF2B5EF4-FFF2-40B4-BE49-F238E27FC236}">
+                <a16:creationId xmlns:a16="http://schemas.microsoft.com/office/drawing/2014/main" id="{81DF7DC3-496B-4D85-373E-5064820E8C21}"/>
+              </a:ext>
+            </a:extLst>
+          </p:cNvPr>
+          <p:cNvPicPr>
+            <a:picLocks noChangeAspect="1"/>
+          </p:cNvPicPr>
+          <p:nvPr/>
+        </p:nvPicPr>
+        <p:blipFill>
+          <a:blip r:embed="rId2">
+            <a:extLst>
+              <a:ext uri="{28A0092B-C50C-407E-A947-70E740481C1C}">
+                <a14:useLocalDpi xmlns:a14="http://schemas.microsoft.com/office/drawing/2010/main" val="0"/>
+              </a:ext>
+            </a:extLst>
+          </a:blip>
+          <a:stretch>
+            <a:fillRect/>
+          </a:stretch>
+        </p:blipFill>
+        <p:spPr>
+          <a:xfrm>
+            <a:off x="3714750" y="1047750"/>
+            <a:ext cx="4762500" cy="4762500"/>
+          </a:xfrm>
+          <a:prstGeom prst="rect">
+            <a:avLst/>
+          </a:prstGeom>
+        </p:spPr>
+      </p:pic>
+    </p:spTree>
+    <p:extLst>
+      <p:ext uri="{BB962C8B-B14F-4D97-AF65-F5344CB8AC3E}">
+        <p14:creationId xmlns:p14="http://schemas.microsoft.com/office/powerpoint/2010/main" val="574431483"/>
+      </p:ext>
+    </p:extLst>
+  </p:cSld>
+  <p:clrMapOvr>
+    <a:masterClrMapping/>
+  </p:clrMapOvr>
+</p:sld>
+</file>
+
+<file path=ppt/slides/slide15.xml><?xml version="1.0" encoding="utf-8"?>
+<p:sld xmlns:a="http://schemas.openxmlformats.org/drawingml/2006/main" xmlns:r="http://schemas.openxmlformats.org/officeDocument/2006/relationships" xmlns:p="http://schemas.openxmlformats.org/presentationml/2006/main">
+  <p:cSld>
+    <p:spTree>
+      <p:nvGrpSpPr>
+        <p:cNvPr id="1" name=""/>
+        <p:cNvGrpSpPr/>
+        <p:nvPr/>
+      </p:nvGrpSpPr>
+      <p:grpSpPr>
+        <a:xfrm>
+          <a:off x="0" y="0"/>
+          <a:ext cx="0" cy="0"/>
+          <a:chOff x="0" y="0"/>
+          <a:chExt cx="0" cy="0"/>
+        </a:xfrm>
+      </p:grpSpPr>
+      <p:pic>
+        <p:nvPicPr>
+          <p:cNvPr id="2" name="Imagen 1" descr="En blanco y negro&#10;&#10;Descripción generada automáticamente con confianza media">
+            <a:extLst>
+              <a:ext uri="{FF2B5EF4-FFF2-40B4-BE49-F238E27FC236}">
+                <a16:creationId xmlns:a16="http://schemas.microsoft.com/office/drawing/2014/main" id="{00F4E326-6D99-8DA2-E474-B2CDFB42754D}"/>
+              </a:ext>
+            </a:extLst>
+          </p:cNvPr>
+          <p:cNvPicPr>
+            <a:picLocks noChangeAspect="1"/>
+          </p:cNvPicPr>
+          <p:nvPr/>
+        </p:nvPicPr>
+        <p:blipFill>
+          <a:blip r:embed="rId2">
+            <a:extLst>
+              <a:ext uri="{28A0092B-C50C-407E-A947-70E740481C1C}">
+                <a14:useLocalDpi xmlns:a14="http://schemas.microsoft.com/office/drawing/2010/main" val="0"/>
+              </a:ext>
+            </a:extLst>
+          </a:blip>
+          <a:stretch>
+            <a:fillRect/>
+          </a:stretch>
+        </p:blipFill>
+        <p:spPr>
+          <a:xfrm>
+            <a:off x="3714750" y="1047750"/>
+            <a:ext cx="4762500" cy="4762500"/>
+          </a:xfrm>
+          <a:prstGeom prst="rect">
+            <a:avLst/>
+          </a:prstGeom>
+        </p:spPr>
+      </p:pic>
+    </p:spTree>
+    <p:extLst>
+      <p:ext uri="{BB962C8B-B14F-4D97-AF65-F5344CB8AC3E}">
+        <p14:creationId xmlns:p14="http://schemas.microsoft.com/office/powerpoint/2010/main" val="1273214043"/>
+      </p:ext>
+    </p:extLst>
+  </p:cSld>
+  <p:clrMapOvr>
+    <a:masterClrMapping/>
+  </p:clrMapOvr>
+</p:sld>
+</file>
+
+<file path=ppt/slides/slide16.xml><?xml version="1.0" encoding="utf-8"?>
+<p:sld xmlns:a="http://schemas.openxmlformats.org/drawingml/2006/main" xmlns:r="http://schemas.openxmlformats.org/officeDocument/2006/relationships" xmlns:p="http://schemas.openxmlformats.org/presentationml/2006/main">
+  <p:cSld>
+    <p:spTree>
+      <p:nvGrpSpPr>
+        <p:cNvPr id="1" name=""/>
+        <p:cNvGrpSpPr/>
+        <p:nvPr/>
+      </p:nvGrpSpPr>
+      <p:grpSpPr>
+        <a:xfrm>
+          <a:off x="0" y="0"/>
+          <a:ext cx="0" cy="0"/>
+          <a:chOff x="0" y="0"/>
+          <a:chExt cx="0" cy="0"/>
+        </a:xfrm>
+      </p:grpSpPr>
+      <p:pic>
+        <p:nvPicPr>
+          <p:cNvPr id="15" name="Imagen 14" descr="Imagen que contiene Forma&#10;&#10;Descripción generada automáticamente">
+            <a:extLst>
+              <a:ext uri="{FF2B5EF4-FFF2-40B4-BE49-F238E27FC236}">
+                <a16:creationId xmlns:a16="http://schemas.microsoft.com/office/drawing/2014/main" id="{C6526B49-DCC2-0D66-B80B-23F4CF38D6B4}"/>
+              </a:ext>
+            </a:extLst>
+          </p:cNvPr>
+          <p:cNvPicPr>
+            <a:picLocks noChangeAspect="1"/>
+          </p:cNvPicPr>
+          <p:nvPr/>
+        </p:nvPicPr>
+        <p:blipFill>
+          <a:blip r:embed="rId2">
+            <a:extLst>
+              <a:ext uri="{28A0092B-C50C-407E-A947-70E740481C1C}">
+                <a14:useLocalDpi xmlns:a14="http://schemas.microsoft.com/office/drawing/2010/main" val="0"/>
+              </a:ext>
+            </a:extLst>
+          </a:blip>
+          <a:stretch>
+            <a:fillRect/>
+          </a:stretch>
+        </p:blipFill>
+        <p:spPr>
+          <a:xfrm>
+            <a:off x="3714750" y="1047750"/>
+            <a:ext cx="4762500" cy="4762500"/>
+          </a:xfrm>
+          <a:prstGeom prst="rect">
+            <a:avLst/>
+          </a:prstGeom>
+        </p:spPr>
+      </p:pic>
+    </p:spTree>
+    <p:extLst>
+      <p:ext uri="{BB962C8B-B14F-4D97-AF65-F5344CB8AC3E}">
+        <p14:creationId xmlns:p14="http://schemas.microsoft.com/office/powerpoint/2010/main" val="4225380200"/>
+      </p:ext>
+    </p:extLst>
+  </p:cSld>
+  <p:clrMapOvr>
+    <a:masterClrMapping/>
+  </p:clrMapOvr>
+</p:sld>
+</file>
+
+<file path=ppt/slides/slide17.xml><?xml version="1.0" encoding="utf-8"?>
+<p:sld xmlns:a="http://schemas.openxmlformats.org/drawingml/2006/main" xmlns:r="http://schemas.openxmlformats.org/officeDocument/2006/relationships" xmlns:p="http://schemas.openxmlformats.org/presentationml/2006/main">
+  <p:cSld>
+    <p:spTree>
+      <p:nvGrpSpPr>
+        <p:cNvPr id="1" name=""/>
+        <p:cNvGrpSpPr/>
+        <p:nvPr/>
+      </p:nvGrpSpPr>
+      <p:grpSpPr>
+        <a:xfrm>
+          <a:off x="0" y="0"/>
+          <a:ext cx="0" cy="0"/>
+          <a:chOff x="0" y="0"/>
+          <a:chExt cx="0" cy="0"/>
+        </a:xfrm>
+      </p:grpSpPr>
+      <p:pic>
+        <p:nvPicPr>
+          <p:cNvPr id="2" name="Imagen 1" descr="Icono&#10;&#10;Descripción generada automáticamente">
+            <a:extLst>
+              <a:ext uri="{FF2B5EF4-FFF2-40B4-BE49-F238E27FC236}">
+                <a16:creationId xmlns:a16="http://schemas.microsoft.com/office/drawing/2014/main" id="{6FFD704E-9281-25E3-42BA-00117DB10480}"/>
+              </a:ext>
+            </a:extLst>
+          </p:cNvPr>
+          <p:cNvPicPr>
+            <a:picLocks noChangeAspect="1"/>
+          </p:cNvPicPr>
+          <p:nvPr/>
+        </p:nvPicPr>
+        <p:blipFill>
+          <a:blip r:embed="rId2">
+            <a:extLst>
+              <a:ext uri="{28A0092B-C50C-407E-A947-70E740481C1C}">
+                <a14:useLocalDpi xmlns:a14="http://schemas.microsoft.com/office/drawing/2010/main" val="0"/>
+              </a:ext>
+            </a:extLst>
+          </a:blip>
+          <a:stretch>
+            <a:fillRect/>
+          </a:stretch>
+        </p:blipFill>
+        <p:spPr>
+          <a:xfrm>
+            <a:off x="3714750" y="1047750"/>
+            <a:ext cx="4762500" cy="4762500"/>
+          </a:xfrm>
+          <a:prstGeom prst="rect">
+            <a:avLst/>
+          </a:prstGeom>
+        </p:spPr>
+      </p:pic>
+    </p:spTree>
+    <p:extLst>
+      <p:ext uri="{BB962C8B-B14F-4D97-AF65-F5344CB8AC3E}">
+        <p14:creationId xmlns:p14="http://schemas.microsoft.com/office/powerpoint/2010/main" val="2442641298"/>
+      </p:ext>
+    </p:extLst>
+  </p:cSld>
+  <p:clrMapOvr>
+    <a:masterClrMapping/>
+  </p:clrMapOvr>
+</p:sld>
+</file>
+
+<file path=ppt/slides/slide18.xml><?xml version="1.0" encoding="utf-8"?>
+<p:sld xmlns:a="http://schemas.openxmlformats.org/drawingml/2006/main" xmlns:r="http://schemas.openxmlformats.org/officeDocument/2006/relationships" xmlns:p="http://schemas.openxmlformats.org/presentationml/2006/main">
+  <p:cSld>
+    <p:spTree>
+      <p:nvGrpSpPr>
+        <p:cNvPr id="1" name=""/>
+        <p:cNvGrpSpPr/>
+        <p:nvPr/>
+      </p:nvGrpSpPr>
+      <p:grpSpPr>
+        <a:xfrm>
+          <a:off x="0" y="0"/>
+          <a:ext cx="0" cy="0"/>
+          <a:chOff x="0" y="0"/>
+          <a:chExt cx="0" cy="0"/>
+        </a:xfrm>
+      </p:grpSpPr>
+      <p:pic>
+        <p:nvPicPr>
+          <p:cNvPr id="2" name="Imagen 1" descr="Círculo&#10;&#10;Descripción generada automáticamente con confianza media">
+            <a:extLst>
+              <a:ext uri="{FF2B5EF4-FFF2-40B4-BE49-F238E27FC236}">
+                <a16:creationId xmlns:a16="http://schemas.microsoft.com/office/drawing/2014/main" id="{D03FEDB2-233D-6C68-7403-772A10A1EDD0}"/>
+              </a:ext>
+            </a:extLst>
+          </p:cNvPr>
+          <p:cNvPicPr>
+            <a:picLocks noChangeAspect="1"/>
+          </p:cNvPicPr>
+          <p:nvPr/>
+        </p:nvPicPr>
+        <p:blipFill>
+          <a:blip r:embed="rId2">
+            <a:extLst>
+              <a:ext uri="{28A0092B-C50C-407E-A947-70E740481C1C}">
+                <a14:useLocalDpi xmlns:a14="http://schemas.microsoft.com/office/drawing/2010/main" val="0"/>
+              </a:ext>
+            </a:extLst>
+          </a:blip>
+          <a:stretch>
+            <a:fillRect/>
+          </a:stretch>
+        </p:blipFill>
+        <p:spPr>
+          <a:xfrm>
+            <a:off x="3714750" y="1047750"/>
+            <a:ext cx="4762500" cy="4762500"/>
+          </a:xfrm>
+          <a:prstGeom prst="rect">
+            <a:avLst/>
+          </a:prstGeom>
+        </p:spPr>
+      </p:pic>
+    </p:spTree>
+    <p:extLst>
+      <p:ext uri="{BB962C8B-B14F-4D97-AF65-F5344CB8AC3E}">
+        <p14:creationId xmlns:p14="http://schemas.microsoft.com/office/powerpoint/2010/main" val="1813705300"/>
+      </p:ext>
+    </p:extLst>
+  </p:cSld>
+  <p:clrMapOvr>
+    <a:masterClrMapping/>
+  </p:clrMapOvr>
+</p:sld>
+</file>
+
+<file path=ppt/slides/slide19.xml><?xml version="1.0" encoding="utf-8"?>
+<p:sld xmlns:a="http://schemas.openxmlformats.org/drawingml/2006/main" xmlns:r="http://schemas.openxmlformats.org/officeDocument/2006/relationships" xmlns:p="http://schemas.openxmlformats.org/presentationml/2006/main">
+  <p:cSld>
+    <p:spTree>
+      <p:nvGrpSpPr>
+        <p:cNvPr id="1" name=""/>
+        <p:cNvGrpSpPr/>
+        <p:nvPr/>
+      </p:nvGrpSpPr>
+      <p:grpSpPr>
+        <a:xfrm>
+          <a:off x="0" y="0"/>
+          <a:ext cx="0" cy="0"/>
+          <a:chOff x="0" y="0"/>
+          <a:chExt cx="0" cy="0"/>
+        </a:xfrm>
+      </p:grpSpPr>
+      <p:pic>
+        <p:nvPicPr>
+          <p:cNvPr id="2" name="Imagen 1" descr="Logotipo&#10;&#10;Descripción generada automáticamente con confianza media">
+            <a:extLst>
+              <a:ext uri="{FF2B5EF4-FFF2-40B4-BE49-F238E27FC236}">
+                <a16:creationId xmlns:a16="http://schemas.microsoft.com/office/drawing/2014/main" id="{444348C7-8FCC-8586-A05A-6C1F47351F31}"/>
+              </a:ext>
+            </a:extLst>
+          </p:cNvPr>
+          <p:cNvPicPr>
+            <a:picLocks noChangeAspect="1"/>
+          </p:cNvPicPr>
+          <p:nvPr/>
+        </p:nvPicPr>
+        <p:blipFill>
+          <a:blip r:embed="rId2">
+            <a:extLst>
+              <a:ext uri="{28A0092B-C50C-407E-A947-70E740481C1C}">
+                <a14:useLocalDpi xmlns:a14="http://schemas.microsoft.com/office/drawing/2010/main" val="0"/>
+              </a:ext>
+            </a:extLst>
+          </a:blip>
+          <a:stretch>
+            <a:fillRect/>
+          </a:stretch>
+        </p:blipFill>
+        <p:spPr>
+          <a:xfrm>
+            <a:off x="3714750" y="1047750"/>
+            <a:ext cx="4762500" cy="4762500"/>
+          </a:xfrm>
+          <a:prstGeom prst="rect">
+            <a:avLst/>
+          </a:prstGeom>
+        </p:spPr>
+      </p:pic>
+    </p:spTree>
+    <p:extLst>
+      <p:ext uri="{BB962C8B-B14F-4D97-AF65-F5344CB8AC3E}">
+        <p14:creationId xmlns:p14="http://schemas.microsoft.com/office/powerpoint/2010/main" val="450371227"/>
+      </p:ext>
+    </p:extLst>
+  </p:cSld>
+  <p:clrMapOvr>
+    <a:masterClrMapping/>
+  </p:clrMapOvr>
 </p:sld>
 </file>
 
 <file path=ppt/slides/slide2.xml><?xml version="1.0" encoding="utf-8"?>
-<p:sld xmlns:a="http://schemas.openxmlformats.org/drawingml/2006/main" xmlns:r="http://schemas.openxmlformats.org/officeDocument/2006/relationships" xmlns:p="http://schemas.openxmlformats.org/presentationml/2006/main" xmlns:m="http://schemas.openxmlformats.org/officeDocument/2006/math" xmlns:w="http://schemas.openxmlformats.org/wordprocessingml/2006/main" showMasterPhAnim="0" show="1">
-  <p:cSld name="">
+<p:sld xmlns:a="http://schemas.openxmlformats.org/drawingml/2006/main" xmlns:r="http://schemas.openxmlformats.org/officeDocument/2006/relationships" xmlns:p="http://schemas.openxmlformats.org/presentationml/2006/main" showMasterPhAnim="0">
+  <p:cSld>
     <p:spTree>
       <p:nvGrpSpPr>
         <p:cNvPr id="1" name=""/>
@@ -3855,7 +4534,7 @@
             </a:pPr>
             <a:fld id="{CB0B926E-2250-6F6B-31DB-AB052ED04542}" type="slidenum">
               <a:rPr lang="es-ES"/>
-              <a:t/>
+              <a:t>2</a:t>
             </a:fld>
             <a:endParaRPr/>
           </a:p>
@@ -3863,7 +4542,7 @@
       </p:sp>
       <p:pic>
         <p:nvPicPr>
-          <p:cNvPr id="1561111226" name=""/>
+          <p:cNvPr id="1561111226" name="Imagen 1561111225"/>
           <p:cNvPicPr>
             <a:picLocks noChangeAspect="1"/>
           </p:cNvPicPr>
@@ -3888,19 +4567,1199 @@
   <p:clrMapOvr>
     <a:masterClrMapping/>
   </p:clrMapOvr>
-  <mc:AlternateContent xmlns:mc="http://schemas.openxmlformats.org/markup-compatibility/2006">
-    <mc:Choice xmlns:p159="http://schemas.microsoft.com/office/powerpoint/2015/09/main" xmlns:p14="http://schemas.microsoft.com/office/powerpoint/2010/main" Requires="p159">
-      <p:transition p14:dur="2000" advClick="1"/>
-    </mc:Choice>
-    <mc:Fallback>
-      <p:transition advClick="1"/>
-    </mc:Fallback>
-  </mc:AlternateContent>
+</p:sld>
+</file>
+
+<file path=ppt/slides/slide20.xml><?xml version="1.0" encoding="utf-8"?>
+<p:sld xmlns:a="http://schemas.openxmlformats.org/drawingml/2006/main" xmlns:r="http://schemas.openxmlformats.org/officeDocument/2006/relationships" xmlns:p="http://schemas.openxmlformats.org/presentationml/2006/main">
+  <p:cSld>
+    <p:spTree>
+      <p:nvGrpSpPr>
+        <p:cNvPr id="1" name=""/>
+        <p:cNvGrpSpPr/>
+        <p:nvPr/>
+      </p:nvGrpSpPr>
+      <p:grpSpPr>
+        <a:xfrm>
+          <a:off x="0" y="0"/>
+          <a:ext cx="0" cy="0"/>
+          <a:chOff x="0" y="0"/>
+          <a:chExt cx="0" cy="0"/>
+        </a:xfrm>
+      </p:grpSpPr>
+      <p:pic>
+        <p:nvPicPr>
+          <p:cNvPr id="2" name="Imagen 1" descr="Un dibujo de una persona&#10;&#10;Descripción generada automáticamente con confianza baja">
+            <a:extLst>
+              <a:ext uri="{FF2B5EF4-FFF2-40B4-BE49-F238E27FC236}">
+                <a16:creationId xmlns:a16="http://schemas.microsoft.com/office/drawing/2014/main" id="{475989A7-ED89-B462-303B-5917BF2871CA}"/>
+              </a:ext>
+            </a:extLst>
+          </p:cNvPr>
+          <p:cNvPicPr>
+            <a:picLocks noChangeAspect="1"/>
+          </p:cNvPicPr>
+          <p:nvPr/>
+        </p:nvPicPr>
+        <p:blipFill>
+          <a:blip r:embed="rId2">
+            <a:extLst>
+              <a:ext uri="{28A0092B-C50C-407E-A947-70E740481C1C}">
+                <a14:useLocalDpi xmlns:a14="http://schemas.microsoft.com/office/drawing/2010/main" val="0"/>
+              </a:ext>
+            </a:extLst>
+          </a:blip>
+          <a:stretch>
+            <a:fillRect/>
+          </a:stretch>
+        </p:blipFill>
+        <p:spPr>
+          <a:xfrm>
+            <a:off x="3714750" y="1047750"/>
+            <a:ext cx="4762500" cy="4762500"/>
+          </a:xfrm>
+          <a:prstGeom prst="rect">
+            <a:avLst/>
+          </a:prstGeom>
+        </p:spPr>
+      </p:pic>
+    </p:spTree>
+    <p:extLst>
+      <p:ext uri="{BB962C8B-B14F-4D97-AF65-F5344CB8AC3E}">
+        <p14:creationId xmlns:p14="http://schemas.microsoft.com/office/powerpoint/2010/main" val="1362931300"/>
+      </p:ext>
+    </p:extLst>
+  </p:cSld>
+  <p:clrMapOvr>
+    <a:masterClrMapping/>
+  </p:clrMapOvr>
+</p:sld>
+</file>
+
+<file path=ppt/slides/slide21.xml><?xml version="1.0" encoding="utf-8"?>
+<p:sld xmlns:a="http://schemas.openxmlformats.org/drawingml/2006/main" xmlns:r="http://schemas.openxmlformats.org/officeDocument/2006/relationships" xmlns:p="http://schemas.openxmlformats.org/presentationml/2006/main">
+  <p:cSld>
+    <p:spTree>
+      <p:nvGrpSpPr>
+        <p:cNvPr id="1" name=""/>
+        <p:cNvGrpSpPr/>
+        <p:nvPr/>
+      </p:nvGrpSpPr>
+      <p:grpSpPr>
+        <a:xfrm>
+          <a:off x="0" y="0"/>
+          <a:ext cx="0" cy="0"/>
+          <a:chOff x="0" y="0"/>
+          <a:chExt cx="0" cy="0"/>
+        </a:xfrm>
+      </p:grpSpPr>
+      <p:pic>
+        <p:nvPicPr>
+          <p:cNvPr id="2" name="Imagen 1" descr="Un dibujo de una persona&#10;&#10;Descripción generada automáticamente con confianza baja">
+            <a:extLst>
+              <a:ext uri="{FF2B5EF4-FFF2-40B4-BE49-F238E27FC236}">
+                <a16:creationId xmlns:a16="http://schemas.microsoft.com/office/drawing/2014/main" id="{C360AD43-B901-8F97-5A66-63BDF0B1D144}"/>
+              </a:ext>
+            </a:extLst>
+          </p:cNvPr>
+          <p:cNvPicPr>
+            <a:picLocks noChangeAspect="1"/>
+          </p:cNvPicPr>
+          <p:nvPr/>
+        </p:nvPicPr>
+        <p:blipFill>
+          <a:blip r:embed="rId2">
+            <a:extLst>
+              <a:ext uri="{28A0092B-C50C-407E-A947-70E740481C1C}">
+                <a14:useLocalDpi xmlns:a14="http://schemas.microsoft.com/office/drawing/2010/main" val="0"/>
+              </a:ext>
+            </a:extLst>
+          </a:blip>
+          <a:stretch>
+            <a:fillRect/>
+          </a:stretch>
+        </p:blipFill>
+        <p:spPr>
+          <a:xfrm>
+            <a:off x="3714750" y="1047750"/>
+            <a:ext cx="4762500" cy="4762500"/>
+          </a:xfrm>
+          <a:prstGeom prst="rect">
+            <a:avLst/>
+          </a:prstGeom>
+        </p:spPr>
+      </p:pic>
+    </p:spTree>
+    <p:extLst>
+      <p:ext uri="{BB962C8B-B14F-4D97-AF65-F5344CB8AC3E}">
+        <p14:creationId xmlns:p14="http://schemas.microsoft.com/office/powerpoint/2010/main" val="1153841151"/>
+      </p:ext>
+    </p:extLst>
+  </p:cSld>
+  <p:clrMapOvr>
+    <a:masterClrMapping/>
+  </p:clrMapOvr>
+</p:sld>
+</file>
+
+<file path=ppt/slides/slide22.xml><?xml version="1.0" encoding="utf-8"?>
+<p:sld xmlns:a="http://schemas.openxmlformats.org/drawingml/2006/main" xmlns:r="http://schemas.openxmlformats.org/officeDocument/2006/relationships" xmlns:p="http://schemas.openxmlformats.org/presentationml/2006/main">
+  <p:cSld>
+    <p:spTree>
+      <p:nvGrpSpPr>
+        <p:cNvPr id="1" name=""/>
+        <p:cNvGrpSpPr/>
+        <p:nvPr/>
+      </p:nvGrpSpPr>
+      <p:grpSpPr>
+        <a:xfrm>
+          <a:off x="0" y="0"/>
+          <a:ext cx="0" cy="0"/>
+          <a:chOff x="0" y="0"/>
+          <a:chExt cx="0" cy="0"/>
+        </a:xfrm>
+      </p:grpSpPr>
+      <p:pic>
+        <p:nvPicPr>
+          <p:cNvPr id="2" name="Imagen 1" descr="Imagen que contiene herramienta, objeto, peine&#10;&#10;Descripción generada automáticamente">
+            <a:extLst>
+              <a:ext uri="{FF2B5EF4-FFF2-40B4-BE49-F238E27FC236}">
+                <a16:creationId xmlns:a16="http://schemas.microsoft.com/office/drawing/2014/main" id="{35AED185-2800-854E-ADDB-E63988A5C413}"/>
+              </a:ext>
+            </a:extLst>
+          </p:cNvPr>
+          <p:cNvPicPr>
+            <a:picLocks noChangeAspect="1"/>
+          </p:cNvPicPr>
+          <p:nvPr/>
+        </p:nvPicPr>
+        <p:blipFill>
+          <a:blip r:embed="rId2">
+            <a:extLst>
+              <a:ext uri="{28A0092B-C50C-407E-A947-70E740481C1C}">
+                <a14:useLocalDpi xmlns:a14="http://schemas.microsoft.com/office/drawing/2010/main" val="0"/>
+              </a:ext>
+            </a:extLst>
+          </a:blip>
+          <a:stretch>
+            <a:fillRect/>
+          </a:stretch>
+        </p:blipFill>
+        <p:spPr>
+          <a:xfrm>
+            <a:off x="3714750" y="1047750"/>
+            <a:ext cx="4762500" cy="4762500"/>
+          </a:xfrm>
+          <a:prstGeom prst="rect">
+            <a:avLst/>
+          </a:prstGeom>
+        </p:spPr>
+      </p:pic>
+    </p:spTree>
+    <p:extLst>
+      <p:ext uri="{BB962C8B-B14F-4D97-AF65-F5344CB8AC3E}">
+        <p14:creationId xmlns:p14="http://schemas.microsoft.com/office/powerpoint/2010/main" val="2901823111"/>
+      </p:ext>
+    </p:extLst>
+  </p:cSld>
+  <p:clrMapOvr>
+    <a:masterClrMapping/>
+  </p:clrMapOvr>
+</p:sld>
+</file>
+
+<file path=ppt/slides/slide23.xml><?xml version="1.0" encoding="utf-8"?>
+<p:sld xmlns:a="http://schemas.openxmlformats.org/drawingml/2006/main" xmlns:r="http://schemas.openxmlformats.org/officeDocument/2006/relationships" xmlns:p="http://schemas.openxmlformats.org/presentationml/2006/main">
+  <p:cSld>
+    <p:spTree>
+      <p:nvGrpSpPr>
+        <p:cNvPr id="1" name=""/>
+        <p:cNvGrpSpPr/>
+        <p:nvPr/>
+      </p:nvGrpSpPr>
+      <p:grpSpPr>
+        <a:xfrm>
+          <a:off x="0" y="0"/>
+          <a:ext cx="0" cy="0"/>
+          <a:chOff x="0" y="0"/>
+          <a:chExt cx="0" cy="0"/>
+        </a:xfrm>
+      </p:grpSpPr>
+      <p:pic>
+        <p:nvPicPr>
+          <p:cNvPr id="2" name="Imagen 1" descr="Imagen que contiene Icono&#10;&#10;Descripción generada automáticamente">
+            <a:extLst>
+              <a:ext uri="{FF2B5EF4-FFF2-40B4-BE49-F238E27FC236}">
+                <a16:creationId xmlns:a16="http://schemas.microsoft.com/office/drawing/2014/main" id="{CD964E1C-CD0A-1C8F-63BB-E0128FE51D47}"/>
+              </a:ext>
+            </a:extLst>
+          </p:cNvPr>
+          <p:cNvPicPr>
+            <a:picLocks noChangeAspect="1"/>
+          </p:cNvPicPr>
+          <p:nvPr/>
+        </p:nvPicPr>
+        <p:blipFill>
+          <a:blip r:embed="rId2">
+            <a:extLst>
+              <a:ext uri="{28A0092B-C50C-407E-A947-70E740481C1C}">
+                <a14:useLocalDpi xmlns:a14="http://schemas.microsoft.com/office/drawing/2010/main" val="0"/>
+              </a:ext>
+            </a:extLst>
+          </a:blip>
+          <a:stretch>
+            <a:fillRect/>
+          </a:stretch>
+        </p:blipFill>
+        <p:spPr>
+          <a:xfrm>
+            <a:off x="3714750" y="1047750"/>
+            <a:ext cx="4762500" cy="4762500"/>
+          </a:xfrm>
+          <a:prstGeom prst="rect">
+            <a:avLst/>
+          </a:prstGeom>
+        </p:spPr>
+      </p:pic>
+    </p:spTree>
+    <p:extLst>
+      <p:ext uri="{BB962C8B-B14F-4D97-AF65-F5344CB8AC3E}">
+        <p14:creationId xmlns:p14="http://schemas.microsoft.com/office/powerpoint/2010/main" val="4024258945"/>
+      </p:ext>
+    </p:extLst>
+  </p:cSld>
+  <p:clrMapOvr>
+    <a:masterClrMapping/>
+  </p:clrMapOvr>
+</p:sld>
+</file>
+
+<file path=ppt/slides/slide24.xml><?xml version="1.0" encoding="utf-8"?>
+<p:sld xmlns:a="http://schemas.openxmlformats.org/drawingml/2006/main" xmlns:r="http://schemas.openxmlformats.org/officeDocument/2006/relationships" xmlns:p="http://schemas.openxmlformats.org/presentationml/2006/main">
+  <p:cSld>
+    <p:spTree>
+      <p:nvGrpSpPr>
+        <p:cNvPr id="1" name=""/>
+        <p:cNvGrpSpPr/>
+        <p:nvPr/>
+      </p:nvGrpSpPr>
+      <p:grpSpPr>
+        <a:xfrm>
+          <a:off x="0" y="0"/>
+          <a:ext cx="0" cy="0"/>
+          <a:chOff x="0" y="0"/>
+          <a:chExt cx="0" cy="0"/>
+        </a:xfrm>
+      </p:grpSpPr>
+      <p:pic>
+        <p:nvPicPr>
+          <p:cNvPr id="2" name="Imagen 1" descr="Forma&#10;&#10;Descripción generada automáticamente">
+            <a:extLst>
+              <a:ext uri="{FF2B5EF4-FFF2-40B4-BE49-F238E27FC236}">
+                <a16:creationId xmlns:a16="http://schemas.microsoft.com/office/drawing/2014/main" id="{3AE6DA8C-6D3D-58C4-E8A1-87C2C0F35838}"/>
+              </a:ext>
+            </a:extLst>
+          </p:cNvPr>
+          <p:cNvPicPr>
+            <a:picLocks noChangeAspect="1"/>
+          </p:cNvPicPr>
+          <p:nvPr/>
+        </p:nvPicPr>
+        <p:blipFill>
+          <a:blip r:embed="rId2">
+            <a:extLst>
+              <a:ext uri="{28A0092B-C50C-407E-A947-70E740481C1C}">
+                <a14:useLocalDpi xmlns:a14="http://schemas.microsoft.com/office/drawing/2010/main" val="0"/>
+              </a:ext>
+            </a:extLst>
+          </a:blip>
+          <a:stretch>
+            <a:fillRect/>
+          </a:stretch>
+        </p:blipFill>
+        <p:spPr>
+          <a:xfrm>
+            <a:off x="3714750" y="1047750"/>
+            <a:ext cx="4762500" cy="4762500"/>
+          </a:xfrm>
+          <a:prstGeom prst="rect">
+            <a:avLst/>
+          </a:prstGeom>
+        </p:spPr>
+      </p:pic>
+    </p:spTree>
+    <p:extLst>
+      <p:ext uri="{BB962C8B-B14F-4D97-AF65-F5344CB8AC3E}">
+        <p14:creationId xmlns:p14="http://schemas.microsoft.com/office/powerpoint/2010/main" val="2578159763"/>
+      </p:ext>
+    </p:extLst>
+  </p:cSld>
+  <p:clrMapOvr>
+    <a:masterClrMapping/>
+  </p:clrMapOvr>
+</p:sld>
+</file>
+
+<file path=ppt/slides/slide25.xml><?xml version="1.0" encoding="utf-8"?>
+<p:sld xmlns:a="http://schemas.openxmlformats.org/drawingml/2006/main" xmlns:r="http://schemas.openxmlformats.org/officeDocument/2006/relationships" xmlns:p="http://schemas.openxmlformats.org/presentationml/2006/main">
+  <p:cSld>
+    <p:spTree>
+      <p:nvGrpSpPr>
+        <p:cNvPr id="1" name=""/>
+        <p:cNvGrpSpPr/>
+        <p:nvPr/>
+      </p:nvGrpSpPr>
+      <p:grpSpPr>
+        <a:xfrm>
+          <a:off x="0" y="0"/>
+          <a:ext cx="0" cy="0"/>
+          <a:chOff x="0" y="0"/>
+          <a:chExt cx="0" cy="0"/>
+        </a:xfrm>
+      </p:grpSpPr>
+      <p:pic>
+        <p:nvPicPr>
+          <p:cNvPr id="2" name="Imagen 1" descr="Un dibujo de una persona&#10;&#10;Descripción generada automáticamente con confianza baja">
+            <a:extLst>
+              <a:ext uri="{FF2B5EF4-FFF2-40B4-BE49-F238E27FC236}">
+                <a16:creationId xmlns:a16="http://schemas.microsoft.com/office/drawing/2014/main" id="{5BAC0E31-0E1C-A14D-B195-50C637AED578}"/>
+              </a:ext>
+            </a:extLst>
+          </p:cNvPr>
+          <p:cNvPicPr>
+            <a:picLocks noChangeAspect="1"/>
+          </p:cNvPicPr>
+          <p:nvPr/>
+        </p:nvPicPr>
+        <p:blipFill>
+          <a:blip r:embed="rId2">
+            <a:extLst>
+              <a:ext uri="{28A0092B-C50C-407E-A947-70E740481C1C}">
+                <a14:useLocalDpi xmlns:a14="http://schemas.microsoft.com/office/drawing/2010/main" val="0"/>
+              </a:ext>
+            </a:extLst>
+          </a:blip>
+          <a:stretch>
+            <a:fillRect/>
+          </a:stretch>
+        </p:blipFill>
+        <p:spPr>
+          <a:xfrm>
+            <a:off x="3714750" y="1047750"/>
+            <a:ext cx="4762500" cy="4762500"/>
+          </a:xfrm>
+          <a:prstGeom prst="rect">
+            <a:avLst/>
+          </a:prstGeom>
+        </p:spPr>
+      </p:pic>
+    </p:spTree>
+    <p:extLst>
+      <p:ext uri="{BB962C8B-B14F-4D97-AF65-F5344CB8AC3E}">
+        <p14:creationId xmlns:p14="http://schemas.microsoft.com/office/powerpoint/2010/main" val="107907919"/>
+      </p:ext>
+    </p:extLst>
+  </p:cSld>
+  <p:clrMapOvr>
+    <a:masterClrMapping/>
+  </p:clrMapOvr>
+</p:sld>
+</file>
+
+<file path=ppt/slides/slide26.xml><?xml version="1.0" encoding="utf-8"?>
+<p:sld xmlns:a="http://schemas.openxmlformats.org/drawingml/2006/main" xmlns:r="http://schemas.openxmlformats.org/officeDocument/2006/relationships" xmlns:p="http://schemas.openxmlformats.org/presentationml/2006/main">
+  <p:cSld>
+    <p:spTree>
+      <p:nvGrpSpPr>
+        <p:cNvPr id="1" name=""/>
+        <p:cNvGrpSpPr/>
+        <p:nvPr/>
+      </p:nvGrpSpPr>
+      <p:grpSpPr>
+        <a:xfrm>
+          <a:off x="0" y="0"/>
+          <a:ext cx="0" cy="0"/>
+          <a:chOff x="0" y="0"/>
+          <a:chExt cx="0" cy="0"/>
+        </a:xfrm>
+      </p:grpSpPr>
+      <p:pic>
+        <p:nvPicPr>
+          <p:cNvPr id="2" name="Imagen 1" descr="Una caricatura de una persona&#10;&#10;Descripción generada automáticamente con confianza media">
+            <a:extLst>
+              <a:ext uri="{FF2B5EF4-FFF2-40B4-BE49-F238E27FC236}">
+                <a16:creationId xmlns:a16="http://schemas.microsoft.com/office/drawing/2014/main" id="{7B478856-04C4-4A67-17C5-920659DCA2D7}"/>
+              </a:ext>
+            </a:extLst>
+          </p:cNvPr>
+          <p:cNvPicPr>
+            <a:picLocks noChangeAspect="1"/>
+          </p:cNvPicPr>
+          <p:nvPr/>
+        </p:nvPicPr>
+        <p:blipFill>
+          <a:blip r:embed="rId2">
+            <a:extLst>
+              <a:ext uri="{28A0092B-C50C-407E-A947-70E740481C1C}">
+                <a14:useLocalDpi xmlns:a14="http://schemas.microsoft.com/office/drawing/2010/main" val="0"/>
+              </a:ext>
+            </a:extLst>
+          </a:blip>
+          <a:stretch>
+            <a:fillRect/>
+          </a:stretch>
+        </p:blipFill>
+        <p:spPr>
+          <a:xfrm>
+            <a:off x="3714750" y="1047750"/>
+            <a:ext cx="4762500" cy="4762500"/>
+          </a:xfrm>
+          <a:prstGeom prst="rect">
+            <a:avLst/>
+          </a:prstGeom>
+        </p:spPr>
+      </p:pic>
+    </p:spTree>
+    <p:extLst>
+      <p:ext uri="{BB962C8B-B14F-4D97-AF65-F5344CB8AC3E}">
+        <p14:creationId xmlns:p14="http://schemas.microsoft.com/office/powerpoint/2010/main" val="2930768439"/>
+      </p:ext>
+    </p:extLst>
+  </p:cSld>
+  <p:clrMapOvr>
+    <a:masterClrMapping/>
+  </p:clrMapOvr>
+</p:sld>
+</file>
+
+<file path=ppt/slides/slide27.xml><?xml version="1.0" encoding="utf-8"?>
+<p:sld xmlns:a="http://schemas.openxmlformats.org/drawingml/2006/main" xmlns:r="http://schemas.openxmlformats.org/officeDocument/2006/relationships" xmlns:p="http://schemas.openxmlformats.org/presentationml/2006/main">
+  <p:cSld>
+    <p:spTree>
+      <p:nvGrpSpPr>
+        <p:cNvPr id="1" name=""/>
+        <p:cNvGrpSpPr/>
+        <p:nvPr/>
+      </p:nvGrpSpPr>
+      <p:grpSpPr>
+        <a:xfrm>
+          <a:off x="0" y="0"/>
+          <a:ext cx="0" cy="0"/>
+          <a:chOff x="0" y="0"/>
+          <a:chExt cx="0" cy="0"/>
+        </a:xfrm>
+      </p:grpSpPr>
+      <p:pic>
+        <p:nvPicPr>
+          <p:cNvPr id="2" name="Imagen 1" descr="Dibujo en blanco y negro&#10;&#10;Descripción generada automáticamente con confianza media">
+            <a:extLst>
+              <a:ext uri="{FF2B5EF4-FFF2-40B4-BE49-F238E27FC236}">
+                <a16:creationId xmlns:a16="http://schemas.microsoft.com/office/drawing/2014/main" id="{DD334F66-743E-49B4-F842-EE556888D45E}"/>
+              </a:ext>
+            </a:extLst>
+          </p:cNvPr>
+          <p:cNvPicPr>
+            <a:picLocks noChangeAspect="1"/>
+          </p:cNvPicPr>
+          <p:nvPr/>
+        </p:nvPicPr>
+        <p:blipFill>
+          <a:blip r:embed="rId2">
+            <a:extLst>
+              <a:ext uri="{28A0092B-C50C-407E-A947-70E740481C1C}">
+                <a14:useLocalDpi xmlns:a14="http://schemas.microsoft.com/office/drawing/2010/main" val="0"/>
+              </a:ext>
+            </a:extLst>
+          </a:blip>
+          <a:stretch>
+            <a:fillRect/>
+          </a:stretch>
+        </p:blipFill>
+        <p:spPr>
+          <a:xfrm>
+            <a:off x="3714750" y="1047750"/>
+            <a:ext cx="4762500" cy="4762500"/>
+          </a:xfrm>
+          <a:prstGeom prst="rect">
+            <a:avLst/>
+          </a:prstGeom>
+        </p:spPr>
+      </p:pic>
+    </p:spTree>
+    <p:extLst>
+      <p:ext uri="{BB962C8B-B14F-4D97-AF65-F5344CB8AC3E}">
+        <p14:creationId xmlns:p14="http://schemas.microsoft.com/office/powerpoint/2010/main" val="1060240736"/>
+      </p:ext>
+    </p:extLst>
+  </p:cSld>
+  <p:clrMapOvr>
+    <a:masterClrMapping/>
+  </p:clrMapOvr>
+</p:sld>
+</file>
+
+<file path=ppt/slides/slide28.xml><?xml version="1.0" encoding="utf-8"?>
+<p:sld xmlns:a="http://schemas.openxmlformats.org/drawingml/2006/main" xmlns:r="http://schemas.openxmlformats.org/officeDocument/2006/relationships" xmlns:p="http://schemas.openxmlformats.org/presentationml/2006/main">
+  <p:cSld>
+    <p:spTree>
+      <p:nvGrpSpPr>
+        <p:cNvPr id="1" name=""/>
+        <p:cNvGrpSpPr/>
+        <p:nvPr/>
+      </p:nvGrpSpPr>
+      <p:grpSpPr>
+        <a:xfrm>
+          <a:off x="0" y="0"/>
+          <a:ext cx="0" cy="0"/>
+          <a:chOff x="0" y="0"/>
+          <a:chExt cx="0" cy="0"/>
+        </a:xfrm>
+      </p:grpSpPr>
+      <p:pic>
+        <p:nvPicPr>
+          <p:cNvPr id="2" name="Imagen 1" descr="Imagen que contiene Logotipo&#10;&#10;Descripción generada automáticamente">
+            <a:extLst>
+              <a:ext uri="{FF2B5EF4-FFF2-40B4-BE49-F238E27FC236}">
+                <a16:creationId xmlns:a16="http://schemas.microsoft.com/office/drawing/2014/main" id="{8908408E-A4A5-727E-D5DD-37DB9E960A7C}"/>
+              </a:ext>
+            </a:extLst>
+          </p:cNvPr>
+          <p:cNvPicPr>
+            <a:picLocks noChangeAspect="1"/>
+          </p:cNvPicPr>
+          <p:nvPr/>
+        </p:nvPicPr>
+        <p:blipFill>
+          <a:blip r:embed="rId2">
+            <a:extLst>
+              <a:ext uri="{28A0092B-C50C-407E-A947-70E740481C1C}">
+                <a14:useLocalDpi xmlns:a14="http://schemas.microsoft.com/office/drawing/2010/main" val="0"/>
+              </a:ext>
+            </a:extLst>
+          </a:blip>
+          <a:stretch>
+            <a:fillRect/>
+          </a:stretch>
+        </p:blipFill>
+        <p:spPr>
+          <a:xfrm>
+            <a:off x="3714750" y="1047750"/>
+            <a:ext cx="4762500" cy="4762500"/>
+          </a:xfrm>
+          <a:prstGeom prst="rect">
+            <a:avLst/>
+          </a:prstGeom>
+        </p:spPr>
+      </p:pic>
+    </p:spTree>
+    <p:extLst>
+      <p:ext uri="{BB962C8B-B14F-4D97-AF65-F5344CB8AC3E}">
+        <p14:creationId xmlns:p14="http://schemas.microsoft.com/office/powerpoint/2010/main" val="4211907901"/>
+      </p:ext>
+    </p:extLst>
+  </p:cSld>
+  <p:clrMapOvr>
+    <a:masterClrMapping/>
+  </p:clrMapOvr>
+</p:sld>
+</file>
+
+<file path=ppt/slides/slide29.xml><?xml version="1.0" encoding="utf-8"?>
+<p:sld xmlns:a="http://schemas.openxmlformats.org/drawingml/2006/main" xmlns:r="http://schemas.openxmlformats.org/officeDocument/2006/relationships" xmlns:p="http://schemas.openxmlformats.org/presentationml/2006/main">
+  <p:cSld>
+    <p:spTree>
+      <p:nvGrpSpPr>
+        <p:cNvPr id="1" name=""/>
+        <p:cNvGrpSpPr/>
+        <p:nvPr/>
+      </p:nvGrpSpPr>
+      <p:grpSpPr>
+        <a:xfrm>
+          <a:off x="0" y="0"/>
+          <a:ext cx="0" cy="0"/>
+          <a:chOff x="0" y="0"/>
+          <a:chExt cx="0" cy="0"/>
+        </a:xfrm>
+      </p:grpSpPr>
+      <p:pic>
+        <p:nvPicPr>
+          <p:cNvPr id="2" name="Imagen 1" descr="Un dibujo de un personaje animado&#10;&#10;Descripción generada automáticamente con confianza baja">
+            <a:extLst>
+              <a:ext uri="{FF2B5EF4-FFF2-40B4-BE49-F238E27FC236}">
+                <a16:creationId xmlns:a16="http://schemas.microsoft.com/office/drawing/2014/main" id="{A852EEC2-58FF-DE13-0C44-4E70F076F319}"/>
+              </a:ext>
+            </a:extLst>
+          </p:cNvPr>
+          <p:cNvPicPr>
+            <a:picLocks noChangeAspect="1"/>
+          </p:cNvPicPr>
+          <p:nvPr/>
+        </p:nvPicPr>
+        <p:blipFill>
+          <a:blip r:embed="rId2">
+            <a:extLst>
+              <a:ext uri="{28A0092B-C50C-407E-A947-70E740481C1C}">
+                <a14:useLocalDpi xmlns:a14="http://schemas.microsoft.com/office/drawing/2010/main" val="0"/>
+              </a:ext>
+            </a:extLst>
+          </a:blip>
+          <a:stretch>
+            <a:fillRect/>
+          </a:stretch>
+        </p:blipFill>
+        <p:spPr>
+          <a:xfrm>
+            <a:off x="3714750" y="1047750"/>
+            <a:ext cx="4762500" cy="4762500"/>
+          </a:xfrm>
+          <a:prstGeom prst="rect">
+            <a:avLst/>
+          </a:prstGeom>
+        </p:spPr>
+      </p:pic>
+    </p:spTree>
+    <p:extLst>
+      <p:ext uri="{BB962C8B-B14F-4D97-AF65-F5344CB8AC3E}">
+        <p14:creationId xmlns:p14="http://schemas.microsoft.com/office/powerpoint/2010/main" val="2254746410"/>
+      </p:ext>
+    </p:extLst>
+  </p:cSld>
+  <p:clrMapOvr>
+    <a:masterClrMapping/>
+  </p:clrMapOvr>
+</p:sld>
+</file>
+
+<file path=ppt/slides/slide3.xml><?xml version="1.0" encoding="utf-8"?>
+<p:sld xmlns:a="http://schemas.openxmlformats.org/drawingml/2006/main" xmlns:r="http://schemas.openxmlformats.org/officeDocument/2006/relationships" xmlns:p="http://schemas.openxmlformats.org/presentationml/2006/main">
+  <p:cSld>
+    <p:spTree>
+      <p:nvGrpSpPr>
+        <p:cNvPr id="1" name=""/>
+        <p:cNvGrpSpPr/>
+        <p:nvPr/>
+      </p:nvGrpSpPr>
+      <p:grpSpPr>
+        <a:xfrm>
+          <a:off x="0" y="0"/>
+          <a:ext cx="0" cy="0"/>
+          <a:chOff x="0" y="0"/>
+          <a:chExt cx="0" cy="0"/>
+        </a:xfrm>
+      </p:grpSpPr>
+      <p:pic>
+        <p:nvPicPr>
+          <p:cNvPr id="58" name="Imagen 57" descr="Imagen que contiene Forma&#10;&#10;Descripción generada automáticamente">
+            <a:extLst>
+              <a:ext uri="{FF2B5EF4-FFF2-40B4-BE49-F238E27FC236}">
+                <a16:creationId xmlns:a16="http://schemas.microsoft.com/office/drawing/2014/main" id="{171BC32B-AE07-2CF9-8A49-58975B625639}"/>
+              </a:ext>
+            </a:extLst>
+          </p:cNvPr>
+          <p:cNvPicPr>
+            <a:picLocks noChangeAspect="1"/>
+          </p:cNvPicPr>
+          <p:nvPr/>
+        </p:nvPicPr>
+        <p:blipFill>
+          <a:blip r:embed="rId2">
+            <a:extLst>
+              <a:ext uri="{28A0092B-C50C-407E-A947-70E740481C1C}">
+                <a14:useLocalDpi xmlns:a14="http://schemas.microsoft.com/office/drawing/2010/main" val="0"/>
+              </a:ext>
+            </a:extLst>
+          </a:blip>
+          <a:stretch>
+            <a:fillRect/>
+          </a:stretch>
+        </p:blipFill>
+        <p:spPr>
+          <a:xfrm>
+            <a:off x="3714750" y="1047750"/>
+            <a:ext cx="4762500" cy="4762500"/>
+          </a:xfrm>
+          <a:prstGeom prst="rect">
+            <a:avLst/>
+          </a:prstGeom>
+        </p:spPr>
+      </p:pic>
+    </p:spTree>
+    <p:extLst>
+      <p:ext uri="{BB962C8B-B14F-4D97-AF65-F5344CB8AC3E}">
+        <p14:creationId xmlns:p14="http://schemas.microsoft.com/office/powerpoint/2010/main" val="2350004838"/>
+      </p:ext>
+    </p:extLst>
+  </p:cSld>
+  <p:clrMapOvr>
+    <a:masterClrMapping/>
+  </p:clrMapOvr>
+</p:sld>
+</file>
+
+<file path=ppt/slides/slide30.xml><?xml version="1.0" encoding="utf-8"?>
+<p:sld xmlns:a="http://schemas.openxmlformats.org/drawingml/2006/main" xmlns:r="http://schemas.openxmlformats.org/officeDocument/2006/relationships" xmlns:p="http://schemas.openxmlformats.org/presentationml/2006/main">
+  <p:cSld>
+    <p:spTree>
+      <p:nvGrpSpPr>
+        <p:cNvPr id="1" name=""/>
+        <p:cNvGrpSpPr/>
+        <p:nvPr/>
+      </p:nvGrpSpPr>
+      <p:grpSpPr>
+        <a:xfrm>
+          <a:off x="0" y="0"/>
+          <a:ext cx="0" cy="0"/>
+          <a:chOff x="0" y="0"/>
+          <a:chExt cx="0" cy="0"/>
+        </a:xfrm>
+      </p:grpSpPr>
+      <p:pic>
+        <p:nvPicPr>
+          <p:cNvPr id="2" name="Imagen 1" descr="Un dibujo animado con letras&#10;&#10;Descripción generada automáticamente con confianza media">
+            <a:extLst>
+              <a:ext uri="{FF2B5EF4-FFF2-40B4-BE49-F238E27FC236}">
+                <a16:creationId xmlns:a16="http://schemas.microsoft.com/office/drawing/2014/main" id="{7514841F-AE3B-A6B3-14F3-DD4BAA910A23}"/>
+              </a:ext>
+            </a:extLst>
+          </p:cNvPr>
+          <p:cNvPicPr>
+            <a:picLocks noChangeAspect="1"/>
+          </p:cNvPicPr>
+          <p:nvPr/>
+        </p:nvPicPr>
+        <p:blipFill>
+          <a:blip r:embed="rId2">
+            <a:extLst>
+              <a:ext uri="{28A0092B-C50C-407E-A947-70E740481C1C}">
+                <a14:useLocalDpi xmlns:a14="http://schemas.microsoft.com/office/drawing/2010/main" val="0"/>
+              </a:ext>
+            </a:extLst>
+          </a:blip>
+          <a:stretch>
+            <a:fillRect/>
+          </a:stretch>
+        </p:blipFill>
+        <p:spPr>
+          <a:xfrm>
+            <a:off x="3714750" y="1047750"/>
+            <a:ext cx="4762500" cy="4762500"/>
+          </a:xfrm>
+          <a:prstGeom prst="rect">
+            <a:avLst/>
+          </a:prstGeom>
+        </p:spPr>
+      </p:pic>
+    </p:spTree>
+    <p:extLst>
+      <p:ext uri="{BB962C8B-B14F-4D97-AF65-F5344CB8AC3E}">
+        <p14:creationId xmlns:p14="http://schemas.microsoft.com/office/powerpoint/2010/main" val="996804646"/>
+      </p:ext>
+    </p:extLst>
+  </p:cSld>
+  <p:clrMapOvr>
+    <a:masterClrMapping/>
+  </p:clrMapOvr>
+</p:sld>
+</file>
+
+<file path=ppt/slides/slide4.xml><?xml version="1.0" encoding="utf-8"?>
+<p:sld xmlns:a="http://schemas.openxmlformats.org/drawingml/2006/main" xmlns:r="http://schemas.openxmlformats.org/officeDocument/2006/relationships" xmlns:p="http://schemas.openxmlformats.org/presentationml/2006/main">
+  <p:cSld>
+    <p:spTree>
+      <p:nvGrpSpPr>
+        <p:cNvPr id="1" name=""/>
+        <p:cNvGrpSpPr/>
+        <p:nvPr/>
+      </p:nvGrpSpPr>
+      <p:grpSpPr>
+        <a:xfrm>
+          <a:off x="0" y="0"/>
+          <a:ext cx="0" cy="0"/>
+          <a:chOff x="0" y="0"/>
+          <a:chExt cx="0" cy="0"/>
+        </a:xfrm>
+      </p:grpSpPr>
+      <p:pic>
+        <p:nvPicPr>
+          <p:cNvPr id="2" name="Imagen 1" descr="Icono&#10;&#10;Descripción generada automáticamente">
+            <a:extLst>
+              <a:ext uri="{FF2B5EF4-FFF2-40B4-BE49-F238E27FC236}">
+                <a16:creationId xmlns:a16="http://schemas.microsoft.com/office/drawing/2014/main" id="{5CCE9376-18B3-B711-83A2-46872A3914A7}"/>
+              </a:ext>
+            </a:extLst>
+          </p:cNvPr>
+          <p:cNvPicPr>
+            <a:picLocks noChangeAspect="1"/>
+          </p:cNvPicPr>
+          <p:nvPr/>
+        </p:nvPicPr>
+        <p:blipFill>
+          <a:blip r:embed="rId2">
+            <a:extLst>
+              <a:ext uri="{28A0092B-C50C-407E-A947-70E740481C1C}">
+                <a14:useLocalDpi xmlns:a14="http://schemas.microsoft.com/office/drawing/2010/main" val="0"/>
+              </a:ext>
+            </a:extLst>
+          </a:blip>
+          <a:stretch>
+            <a:fillRect/>
+          </a:stretch>
+        </p:blipFill>
+        <p:spPr>
+          <a:xfrm>
+            <a:off x="3714750" y="1047750"/>
+            <a:ext cx="4762500" cy="4762500"/>
+          </a:xfrm>
+          <a:prstGeom prst="rect">
+            <a:avLst/>
+          </a:prstGeom>
+        </p:spPr>
+      </p:pic>
+    </p:spTree>
+    <p:extLst>
+      <p:ext uri="{BB962C8B-B14F-4D97-AF65-F5344CB8AC3E}">
+        <p14:creationId xmlns:p14="http://schemas.microsoft.com/office/powerpoint/2010/main" val="1558067453"/>
+      </p:ext>
+    </p:extLst>
+  </p:cSld>
+  <p:clrMapOvr>
+    <a:masterClrMapping/>
+  </p:clrMapOvr>
+</p:sld>
+</file>
+
+<file path=ppt/slides/slide5.xml><?xml version="1.0" encoding="utf-8"?>
+<p:sld xmlns:a="http://schemas.openxmlformats.org/drawingml/2006/main" xmlns:r="http://schemas.openxmlformats.org/officeDocument/2006/relationships" xmlns:p="http://schemas.openxmlformats.org/presentationml/2006/main">
+  <p:cSld>
+    <p:spTree>
+      <p:nvGrpSpPr>
+        <p:cNvPr id="1" name=""/>
+        <p:cNvGrpSpPr/>
+        <p:nvPr/>
+      </p:nvGrpSpPr>
+      <p:grpSpPr>
+        <a:xfrm>
+          <a:off x="0" y="0"/>
+          <a:ext cx="0" cy="0"/>
+          <a:chOff x="0" y="0"/>
+          <a:chExt cx="0" cy="0"/>
+        </a:xfrm>
+      </p:grpSpPr>
+      <p:pic>
+        <p:nvPicPr>
+          <p:cNvPr id="2" name="Imagen 1" descr="Un dibujo de un perro&#10;&#10;Descripción generada automáticamente con confianza media">
+            <a:extLst>
+              <a:ext uri="{FF2B5EF4-FFF2-40B4-BE49-F238E27FC236}">
+                <a16:creationId xmlns:a16="http://schemas.microsoft.com/office/drawing/2014/main" id="{565D1A3F-FF44-B8F5-3A73-019415A1693F}"/>
+              </a:ext>
+            </a:extLst>
+          </p:cNvPr>
+          <p:cNvPicPr>
+            <a:picLocks noChangeAspect="1"/>
+          </p:cNvPicPr>
+          <p:nvPr/>
+        </p:nvPicPr>
+        <p:blipFill>
+          <a:blip r:embed="rId2">
+            <a:extLst>
+              <a:ext uri="{28A0092B-C50C-407E-A947-70E740481C1C}">
+                <a14:useLocalDpi xmlns:a14="http://schemas.microsoft.com/office/drawing/2010/main" val="0"/>
+              </a:ext>
+            </a:extLst>
+          </a:blip>
+          <a:stretch>
+            <a:fillRect/>
+          </a:stretch>
+        </p:blipFill>
+        <p:spPr>
+          <a:xfrm>
+            <a:off x="3714750" y="1047750"/>
+            <a:ext cx="4762500" cy="4762500"/>
+          </a:xfrm>
+          <a:prstGeom prst="rect">
+            <a:avLst/>
+          </a:prstGeom>
+        </p:spPr>
+      </p:pic>
+    </p:spTree>
+    <p:extLst>
+      <p:ext uri="{BB962C8B-B14F-4D97-AF65-F5344CB8AC3E}">
+        <p14:creationId xmlns:p14="http://schemas.microsoft.com/office/powerpoint/2010/main" val="1326012889"/>
+      </p:ext>
+    </p:extLst>
+  </p:cSld>
+  <p:clrMapOvr>
+    <a:masterClrMapping/>
+  </p:clrMapOvr>
+</p:sld>
+</file>
+
+<file path=ppt/slides/slide6.xml><?xml version="1.0" encoding="utf-8"?>
+<p:sld xmlns:a="http://schemas.openxmlformats.org/drawingml/2006/main" xmlns:r="http://schemas.openxmlformats.org/officeDocument/2006/relationships" xmlns:p="http://schemas.openxmlformats.org/presentationml/2006/main">
+  <p:cSld>
+    <p:spTree>
+      <p:nvGrpSpPr>
+        <p:cNvPr id="1" name=""/>
+        <p:cNvGrpSpPr/>
+        <p:nvPr/>
+      </p:nvGrpSpPr>
+      <p:grpSpPr>
+        <a:xfrm>
+          <a:off x="0" y="0"/>
+          <a:ext cx="0" cy="0"/>
+          <a:chOff x="0" y="0"/>
+          <a:chExt cx="0" cy="0"/>
+        </a:xfrm>
+      </p:grpSpPr>
+      <p:pic>
+        <p:nvPicPr>
+          <p:cNvPr id="2" name="Imagen 1" descr="Forma, Círculo&#10;&#10;Descripción generada automáticamente">
+            <a:extLst>
+              <a:ext uri="{FF2B5EF4-FFF2-40B4-BE49-F238E27FC236}">
+                <a16:creationId xmlns:a16="http://schemas.microsoft.com/office/drawing/2014/main" id="{628E7AAF-238C-B367-E1D2-AB118247BFB1}"/>
+              </a:ext>
+            </a:extLst>
+          </p:cNvPr>
+          <p:cNvPicPr>
+            <a:picLocks noChangeAspect="1"/>
+          </p:cNvPicPr>
+          <p:nvPr/>
+        </p:nvPicPr>
+        <p:blipFill>
+          <a:blip r:embed="rId2">
+            <a:extLst>
+              <a:ext uri="{28A0092B-C50C-407E-A947-70E740481C1C}">
+                <a14:useLocalDpi xmlns:a14="http://schemas.microsoft.com/office/drawing/2010/main" val="0"/>
+              </a:ext>
+            </a:extLst>
+          </a:blip>
+          <a:stretch>
+            <a:fillRect/>
+          </a:stretch>
+        </p:blipFill>
+        <p:spPr>
+          <a:xfrm>
+            <a:off x="3714750" y="1047750"/>
+            <a:ext cx="4762500" cy="4762500"/>
+          </a:xfrm>
+          <a:prstGeom prst="rect">
+            <a:avLst/>
+          </a:prstGeom>
+        </p:spPr>
+      </p:pic>
+    </p:spTree>
+    <p:extLst>
+      <p:ext uri="{BB962C8B-B14F-4D97-AF65-F5344CB8AC3E}">
+        <p14:creationId xmlns:p14="http://schemas.microsoft.com/office/powerpoint/2010/main" val="3113212158"/>
+      </p:ext>
+    </p:extLst>
+  </p:cSld>
+  <p:clrMapOvr>
+    <a:masterClrMapping/>
+  </p:clrMapOvr>
+</p:sld>
+</file>
+
+<file path=ppt/slides/slide7.xml><?xml version="1.0" encoding="utf-8"?>
+<p:sld xmlns:a="http://schemas.openxmlformats.org/drawingml/2006/main" xmlns:r="http://schemas.openxmlformats.org/officeDocument/2006/relationships" xmlns:p="http://schemas.openxmlformats.org/presentationml/2006/main">
+  <p:cSld>
+    <p:spTree>
+      <p:nvGrpSpPr>
+        <p:cNvPr id="1" name=""/>
+        <p:cNvGrpSpPr/>
+        <p:nvPr/>
+      </p:nvGrpSpPr>
+      <p:grpSpPr>
+        <a:xfrm>
+          <a:off x="0" y="0"/>
+          <a:ext cx="0" cy="0"/>
+          <a:chOff x="0" y="0"/>
+          <a:chExt cx="0" cy="0"/>
+        </a:xfrm>
+      </p:grpSpPr>
+      <p:pic>
+        <p:nvPicPr>
+          <p:cNvPr id="2" name="Imagen 1" descr="Imagen que contiene señal, dibujo, vidrio&#10;&#10;Descripción generada automáticamente">
+            <a:extLst>
+              <a:ext uri="{FF2B5EF4-FFF2-40B4-BE49-F238E27FC236}">
+                <a16:creationId xmlns:a16="http://schemas.microsoft.com/office/drawing/2014/main" id="{E44319EE-0ACD-91D5-1E4F-3A17442B4115}"/>
+              </a:ext>
+            </a:extLst>
+          </p:cNvPr>
+          <p:cNvPicPr>
+            <a:picLocks noChangeAspect="1"/>
+          </p:cNvPicPr>
+          <p:nvPr/>
+        </p:nvPicPr>
+        <p:blipFill>
+          <a:blip r:embed="rId2">
+            <a:extLst>
+              <a:ext uri="{28A0092B-C50C-407E-A947-70E740481C1C}">
+                <a14:useLocalDpi xmlns:a14="http://schemas.microsoft.com/office/drawing/2010/main" val="0"/>
+              </a:ext>
+            </a:extLst>
+          </a:blip>
+          <a:stretch>
+            <a:fillRect/>
+          </a:stretch>
+        </p:blipFill>
+        <p:spPr>
+          <a:xfrm>
+            <a:off x="3714750" y="1047750"/>
+            <a:ext cx="4762500" cy="4762500"/>
+          </a:xfrm>
+          <a:prstGeom prst="rect">
+            <a:avLst/>
+          </a:prstGeom>
+        </p:spPr>
+      </p:pic>
+    </p:spTree>
+    <p:extLst>
+      <p:ext uri="{BB962C8B-B14F-4D97-AF65-F5344CB8AC3E}">
+        <p14:creationId xmlns:p14="http://schemas.microsoft.com/office/powerpoint/2010/main" val="3883062087"/>
+      </p:ext>
+    </p:extLst>
+  </p:cSld>
+  <p:clrMapOvr>
+    <a:masterClrMapping/>
+  </p:clrMapOvr>
+</p:sld>
+</file>
+
+<file path=ppt/slides/slide8.xml><?xml version="1.0" encoding="utf-8"?>
+<p:sld xmlns:a="http://schemas.openxmlformats.org/drawingml/2006/main" xmlns:r="http://schemas.openxmlformats.org/officeDocument/2006/relationships" xmlns:p="http://schemas.openxmlformats.org/presentationml/2006/main">
+  <p:cSld>
+    <p:spTree>
+      <p:nvGrpSpPr>
+        <p:cNvPr id="1" name=""/>
+        <p:cNvGrpSpPr/>
+        <p:nvPr/>
+      </p:nvGrpSpPr>
+      <p:grpSpPr>
+        <a:xfrm>
+          <a:off x="0" y="0"/>
+          <a:ext cx="0" cy="0"/>
+          <a:chOff x="0" y="0"/>
+          <a:chExt cx="0" cy="0"/>
+        </a:xfrm>
+      </p:grpSpPr>
+      <p:pic>
+        <p:nvPicPr>
+          <p:cNvPr id="2" name="Imagen 1" descr="Imagen que contiene Rectángulo&#10;&#10;Descripción generada automáticamente">
+            <a:extLst>
+              <a:ext uri="{FF2B5EF4-FFF2-40B4-BE49-F238E27FC236}">
+                <a16:creationId xmlns:a16="http://schemas.microsoft.com/office/drawing/2014/main" id="{B7F6F837-5CDC-378B-0F7D-024A3C248596}"/>
+              </a:ext>
+            </a:extLst>
+          </p:cNvPr>
+          <p:cNvPicPr>
+            <a:picLocks noChangeAspect="1"/>
+          </p:cNvPicPr>
+          <p:nvPr/>
+        </p:nvPicPr>
+        <p:blipFill>
+          <a:blip r:embed="rId2">
+            <a:extLst>
+              <a:ext uri="{28A0092B-C50C-407E-A947-70E740481C1C}">
+                <a14:useLocalDpi xmlns:a14="http://schemas.microsoft.com/office/drawing/2010/main" val="0"/>
+              </a:ext>
+            </a:extLst>
+          </a:blip>
+          <a:stretch>
+            <a:fillRect/>
+          </a:stretch>
+        </p:blipFill>
+        <p:spPr>
+          <a:xfrm>
+            <a:off x="3714750" y="1047750"/>
+            <a:ext cx="4762500" cy="4762500"/>
+          </a:xfrm>
+          <a:prstGeom prst="rect">
+            <a:avLst/>
+          </a:prstGeom>
+        </p:spPr>
+      </p:pic>
+    </p:spTree>
+    <p:extLst>
+      <p:ext uri="{BB962C8B-B14F-4D97-AF65-F5344CB8AC3E}">
+        <p14:creationId xmlns:p14="http://schemas.microsoft.com/office/powerpoint/2010/main" val="2481264377"/>
+      </p:ext>
+    </p:extLst>
+  </p:cSld>
+  <p:clrMapOvr>
+    <a:masterClrMapping/>
+  </p:clrMapOvr>
+</p:sld>
+</file>
+
+<file path=ppt/slides/slide9.xml><?xml version="1.0" encoding="utf-8"?>
+<p:sld xmlns:a="http://schemas.openxmlformats.org/drawingml/2006/main" xmlns:r="http://schemas.openxmlformats.org/officeDocument/2006/relationships" xmlns:p="http://schemas.openxmlformats.org/presentationml/2006/main">
+  <p:cSld>
+    <p:spTree>
+      <p:nvGrpSpPr>
+        <p:cNvPr id="1" name=""/>
+        <p:cNvGrpSpPr/>
+        <p:nvPr/>
+      </p:nvGrpSpPr>
+      <p:grpSpPr>
+        <a:xfrm>
+          <a:off x="0" y="0"/>
+          <a:ext cx="0" cy="0"/>
+          <a:chOff x="0" y="0"/>
+          <a:chExt cx="0" cy="0"/>
+        </a:xfrm>
+      </p:grpSpPr>
+      <p:pic>
+        <p:nvPicPr>
+          <p:cNvPr id="2" name="Imagen 1" descr="Imagen que contiene Diagrama&#10;&#10;Descripción generada automáticamente">
+            <a:extLst>
+              <a:ext uri="{FF2B5EF4-FFF2-40B4-BE49-F238E27FC236}">
+                <a16:creationId xmlns:a16="http://schemas.microsoft.com/office/drawing/2014/main" id="{0EB7B0C4-C0C4-B7A6-0CD1-9BDC4F61CFD2}"/>
+              </a:ext>
+            </a:extLst>
+          </p:cNvPr>
+          <p:cNvPicPr>
+            <a:picLocks noChangeAspect="1"/>
+          </p:cNvPicPr>
+          <p:nvPr/>
+        </p:nvPicPr>
+        <p:blipFill>
+          <a:blip r:embed="rId2">
+            <a:extLst>
+              <a:ext uri="{28A0092B-C50C-407E-A947-70E740481C1C}">
+                <a14:useLocalDpi xmlns:a14="http://schemas.microsoft.com/office/drawing/2010/main" val="0"/>
+              </a:ext>
+            </a:extLst>
+          </a:blip>
+          <a:stretch>
+            <a:fillRect/>
+          </a:stretch>
+        </p:blipFill>
+        <p:spPr>
+          <a:xfrm>
+            <a:off x="3714750" y="1047750"/>
+            <a:ext cx="4762500" cy="4762500"/>
+          </a:xfrm>
+          <a:prstGeom prst="rect">
+            <a:avLst/>
+          </a:prstGeom>
+        </p:spPr>
+      </p:pic>
+    </p:spTree>
+    <p:extLst>
+      <p:ext uri="{BB962C8B-B14F-4D97-AF65-F5344CB8AC3E}">
+        <p14:creationId xmlns:p14="http://schemas.microsoft.com/office/powerpoint/2010/main" val="3982850870"/>
+      </p:ext>
+    </p:extLst>
+  </p:cSld>
+  <p:clrMapOvr>
+    <a:masterClrMapping/>
+  </p:clrMapOvr>
 </p:sld>
 </file>
 
 <file path=ppt/theme/theme1.xml><?xml version="1.0" encoding="utf-8"?>
-<a:theme xmlns:a="http://schemas.openxmlformats.org/drawingml/2006/main" xmlns:r="http://schemas.openxmlformats.org/officeDocument/2006/relationships" xmlns:p="http://schemas.openxmlformats.org/presentationml/2006/main" name="Office Theme">
+<a:theme xmlns:a="http://schemas.openxmlformats.org/drawingml/2006/main" name="Office Theme">
   <a:themeElements>
     <a:clrScheme name="New Office">
       <a:dk1>
@@ -4103,11 +5962,12 @@
     </a:fmtScheme>
   </a:themeElements>
   <a:objectDefaults/>
+  <a:extraClrSchemeLst/>
 </a:theme>
 </file>
 
 <file path=ppt/theme/theme2.xml><?xml version="1.0" encoding="utf-8"?>
-<a:theme xmlns:a="http://schemas.openxmlformats.org/drawingml/2006/main" xmlns:r="http://schemas.openxmlformats.org/officeDocument/2006/relationships" xmlns:p="http://schemas.openxmlformats.org/presentationml/2006/main" name="Office Theme">
+<a:theme xmlns:a="http://schemas.openxmlformats.org/drawingml/2006/main" name="Office Theme">
   <a:themeElements>
     <a:clrScheme name="Office">
       <a:dk1>
@@ -4310,5 +6170,6 @@
     </a:fmtScheme>
   </a:themeElements>
   <a:objectDefaults/>
+  <a:extraClrSchemeLst/>
 </a:theme>
 </file>
</xml_diff>

<commit_message>
Liitle changes on last commit
</commit_message>
<xml_diff>
--- a/repo/acts/tthv/rf/pres.pptx
+++ b/repo/acts/tthv/rf/pres.pptx
@@ -9,19 +9,19 @@
   </p:notesMasterIdLst>
   <p:sldIdLst>
     <p:sldId id="256" r:id="rId2"/>
-    <p:sldId id="257" r:id="rId3"/>
-    <p:sldId id="258" r:id="rId4"/>
+    <p:sldId id="258" r:id="rId3"/>
+    <p:sldId id="271" r:id="rId4"/>
     <p:sldId id="277" r:id="rId5"/>
-    <p:sldId id="276" r:id="rId6"/>
+    <p:sldId id="273" r:id="rId6"/>
     <p:sldId id="275" r:id="rId7"/>
-    <p:sldId id="274" r:id="rId8"/>
-    <p:sldId id="273" r:id="rId9"/>
+    <p:sldId id="276" r:id="rId8"/>
+    <p:sldId id="274" r:id="rId9"/>
     <p:sldId id="272" r:id="rId10"/>
-    <p:sldId id="271" r:id="rId11"/>
-    <p:sldId id="270" r:id="rId12"/>
+    <p:sldId id="270" r:id="rId11"/>
+    <p:sldId id="259" r:id="rId12"/>
     <p:sldId id="269" r:id="rId13"/>
     <p:sldId id="268" r:id="rId14"/>
-    <p:sldId id="259" r:id="rId15"/>
+    <p:sldId id="257" r:id="rId15"/>
     <p:sldId id="260" r:id="rId16"/>
     <p:sldId id="261" r:id="rId17"/>
     <p:sldId id="285" r:id="rId18"/>
@@ -673,7 +673,7 @@
             <a:pPr>
               <a:defRPr/>
             </a:pPr>
-            <a:endParaRPr lang="es-ES">
+            <a:endParaRPr lang="es-ES" dirty="0">
               <a:latin typeface="Arial"/>
               <a:cs typeface="Arial"/>
             </a:endParaRPr>
@@ -700,7 +700,7 @@
             </a:pPr>
             <a:fld id="{2CFA0668-7658-FB19-D335-9E7B75928417}" type="slidenum">
               <a:rPr lang="es-ES"/>
-              <a:t>2</a:t>
+              <a:t>14</a:t>
             </a:fld>
             <a:endParaRPr lang="es-ES"/>
           </a:p>
@@ -850,8 +850,8 @@
             <a:pPr>
               <a:defRPr/>
             </a:pPr>
-            <a:fld id="{BCC18F51-09EC-435C-A3BA-64A766E099C0}" type="datetimeFigureOut">
-              <a:rPr lang="es-ES"/>
+            <a:fld id="{30E88ACD-C363-4AD3-90DC-35137839674B}" type="datetime1">
+              <a:rPr lang="es-ES" smtClean="0"/>
               <a:t>01/12/2023</a:t>
             </a:fld>
             <a:endParaRPr lang="es-ES"/>
@@ -1039,8 +1039,8 @@
             <a:pPr>
               <a:defRPr/>
             </a:pPr>
-            <a:fld id="{BCC18F51-09EC-435C-A3BA-64A766E099C0}" type="datetimeFigureOut">
-              <a:rPr lang="es-ES"/>
+            <a:fld id="{A6B3E936-21F0-4EFC-A7E7-11639DD99D95}" type="datetime1">
+              <a:rPr lang="es-ES" smtClean="0"/>
               <a:t>01/12/2023</a:t>
             </a:fld>
             <a:endParaRPr lang="es-ES"/>
@@ -1238,8 +1238,8 @@
             <a:pPr>
               <a:defRPr/>
             </a:pPr>
-            <a:fld id="{BCC18F51-09EC-435C-A3BA-64A766E099C0}" type="datetimeFigureOut">
-              <a:rPr lang="es-ES"/>
+            <a:fld id="{E84F9A77-8D37-40F9-A8D0-187C3BE85B1A}" type="datetime1">
+              <a:rPr lang="es-ES" smtClean="0"/>
               <a:t>01/12/2023</a:t>
             </a:fld>
             <a:endParaRPr lang="es-ES"/>
@@ -1427,8 +1427,8 @@
             <a:pPr>
               <a:defRPr/>
             </a:pPr>
-            <a:fld id="{BCC18F51-09EC-435C-A3BA-64A766E099C0}" type="datetimeFigureOut">
-              <a:rPr lang="es-ES"/>
+            <a:fld id="{559B5E1E-9C9E-4107-ACAC-E5FB23663C7E}" type="datetime1">
+              <a:rPr lang="es-ES" smtClean="0"/>
               <a:t>01/12/2023</a:t>
             </a:fld>
             <a:endParaRPr lang="es-ES"/>
@@ -1682,8 +1682,8 @@
             <a:pPr>
               <a:defRPr/>
             </a:pPr>
-            <a:fld id="{BCC18F51-09EC-435C-A3BA-64A766E099C0}" type="datetimeFigureOut">
-              <a:rPr lang="es-ES"/>
+            <a:fld id="{3F7F84F8-2807-46A3-88BA-36DAC9923858}" type="datetime1">
+              <a:rPr lang="es-ES" smtClean="0"/>
               <a:t>01/12/2023</a:t>
             </a:fld>
             <a:endParaRPr lang="es-ES"/>
@@ -1946,8 +1946,8 @@
             <a:pPr>
               <a:defRPr/>
             </a:pPr>
-            <a:fld id="{BCC18F51-09EC-435C-A3BA-64A766E099C0}" type="datetimeFigureOut">
-              <a:rPr lang="es-ES"/>
+            <a:fld id="{5A058347-FB6F-4C70-9FF6-69402AACEEF0}" type="datetime1">
+              <a:rPr lang="es-ES" smtClean="0"/>
               <a:t>01/12/2023</a:t>
             </a:fld>
             <a:endParaRPr lang="es-ES"/>
@@ -2351,8 +2351,8 @@
             <a:pPr>
               <a:defRPr/>
             </a:pPr>
-            <a:fld id="{BCC18F51-09EC-435C-A3BA-64A766E099C0}" type="datetimeFigureOut">
-              <a:rPr lang="es-ES"/>
+            <a:fld id="{AF446AE6-5667-4FD4-B94A-80361FB8BAE2}" type="datetime1">
+              <a:rPr lang="es-ES" smtClean="0"/>
               <a:t>01/12/2023</a:t>
             </a:fld>
             <a:endParaRPr lang="es-ES"/>
@@ -2475,8 +2475,8 @@
             <a:pPr>
               <a:defRPr/>
             </a:pPr>
-            <a:fld id="{BCC18F51-09EC-435C-A3BA-64A766E099C0}" type="datetimeFigureOut">
-              <a:rPr lang="es-ES"/>
+            <a:fld id="{40180956-B36E-46E9-92D3-15B667331E23}" type="datetime1">
+              <a:rPr lang="es-ES" smtClean="0"/>
               <a:t>01/12/2023</a:t>
             </a:fld>
             <a:endParaRPr lang="es-ES"/>
@@ -2574,8 +2574,8 @@
             <a:pPr>
               <a:defRPr/>
             </a:pPr>
-            <a:fld id="{BCC18F51-09EC-435C-A3BA-64A766E099C0}" type="datetimeFigureOut">
-              <a:rPr lang="es-ES"/>
+            <a:fld id="{B305010E-2B17-493E-8403-99E2D0A8DCCD}" type="datetime1">
+              <a:rPr lang="es-ES" smtClean="0"/>
               <a:t>01/12/2023</a:t>
             </a:fld>
             <a:endParaRPr lang="es-ES"/>
@@ -2617,16 +2617,23 @@
         <p:spPr bwMode="auto"/>
         <p:txBody>
           <a:bodyPr/>
-          <a:lstStyle/>
+          <a:lstStyle>
+            <a:lvl1pPr>
+              <a:defRPr sz="3600"/>
+            </a:lvl1pPr>
+          </a:lstStyle>
           <a:p>
             <a:pPr>
               <a:defRPr/>
             </a:pPr>
             <a:fld id="{08395586-F03A-48D1-94DF-16B239DF4FB5}" type="slidenum">
-              <a:rPr lang="es-ES"/>
+              <a:rPr lang="es-ES" smtClean="0"/>
+              <a:pPr>
+                <a:defRPr/>
+              </a:pPr>
               <a:t>‹Nº›</a:t>
             </a:fld>
-            <a:endParaRPr lang="es-ES"/>
+            <a:endParaRPr lang="es-ES" dirty="0"/>
           </a:p>
         </p:txBody>
       </p:sp>
@@ -2873,8 +2880,8 @@
             <a:pPr>
               <a:defRPr/>
             </a:pPr>
-            <a:fld id="{BCC18F51-09EC-435C-A3BA-64A766E099C0}" type="datetimeFigureOut">
-              <a:rPr lang="es-ES"/>
+            <a:fld id="{9ABBCEB3-CA9D-45F1-9923-CC11BD740460}" type="datetime1">
+              <a:rPr lang="es-ES" smtClean="0"/>
               <a:t>01/12/2023</a:t>
             </a:fld>
             <a:endParaRPr lang="es-ES"/>
@@ -3141,8 +3148,8 @@
             <a:pPr>
               <a:defRPr/>
             </a:pPr>
-            <a:fld id="{BCC18F51-09EC-435C-A3BA-64A766E099C0}" type="datetimeFigureOut">
-              <a:rPr lang="es-ES"/>
+            <a:fld id="{D8F096AA-C87F-4E06-8502-F6406CE7D320}" type="datetime1">
+              <a:rPr lang="es-ES" smtClean="0"/>
               <a:t>01/12/2023</a:t>
             </a:fld>
             <a:endParaRPr lang="es-ES"/>
@@ -3373,8 +3380,8 @@
             <a:pPr>
               <a:defRPr/>
             </a:pPr>
-            <a:fld id="{BCC18F51-09EC-435C-A3BA-64A766E099C0}" type="datetimeFigureOut">
-              <a:rPr lang="es-ES"/>
+            <a:fld id="{8252553A-185C-4096-9429-16E8CAC5BD6D}" type="datetime1">
+              <a:rPr lang="es-ES" smtClean="0"/>
               <a:t>01/12/2023</a:t>
             </a:fld>
             <a:endParaRPr lang="es-ES"/>
@@ -3481,6 +3488,7 @@
     <p:sldLayoutId id="2147483658" r:id="rId10"/>
     <p:sldLayoutId id="2147483659" r:id="rId11"/>
   </p:sldLayoutIdLst>
+  <p:hf hdr="0" ftr="0" dt="0"/>
   <p:txStyles>
     <p:titleStyle>
       <a:lvl1pPr algn="l" defTabSz="914400">
@@ -3856,10 +3864,10 @@
       </p:grpSpPr>
       <p:pic>
         <p:nvPicPr>
-          <p:cNvPr id="2" name="Imagen 1" descr="Imagen que contiene Icono&#10;&#10;Descripción generada automáticamente">
+          <p:cNvPr id="2" name="Imagen 1" descr="Un dibujo de una persona&#10;&#10;Descripción generada automáticamente con confianza media">
             <a:extLst>
               <a:ext uri="{FF2B5EF4-FFF2-40B4-BE49-F238E27FC236}">
-                <a16:creationId xmlns:a16="http://schemas.microsoft.com/office/drawing/2014/main" id="{DA6372CB-2000-0567-7FC6-DAE631FB8105}"/>
+                <a16:creationId xmlns:a16="http://schemas.microsoft.com/office/drawing/2014/main" id="{9364BEA8-864E-D3B1-E4F2-DD9958EF4180}"/>
               </a:ext>
             </a:extLst>
           </p:cNvPr>
@@ -3890,10 +3898,42 @@
           </a:prstGeom>
         </p:spPr>
       </p:pic>
+      <p:sp>
+        <p:nvSpPr>
+          <p:cNvPr id="3" name="Marcador de número de diapositiva 2">
+            <a:extLst>
+              <a:ext uri="{FF2B5EF4-FFF2-40B4-BE49-F238E27FC236}">
+                <a16:creationId xmlns:a16="http://schemas.microsoft.com/office/drawing/2014/main" id="{0038A3F3-0B9E-4783-06B5-7A9D3A3C3B02}"/>
+              </a:ext>
+            </a:extLst>
+          </p:cNvPr>
+          <p:cNvSpPr>
+            <a:spLocks noGrp="1"/>
+          </p:cNvSpPr>
+          <p:nvPr>
+            <p:ph type="sldNum" sz="quarter" idx="12"/>
+          </p:nvPr>
+        </p:nvSpPr>
+        <p:spPr/>
+        <p:txBody>
+          <a:bodyPr/>
+          <a:lstStyle/>
+          <a:p>
+            <a:pPr>
+              <a:defRPr/>
+            </a:pPr>
+            <a:fld id="{08395586-F03A-48D1-94DF-16B239DF4FB5}" type="slidenum">
+              <a:rPr lang="es-ES" smtClean="0"/>
+              <a:t>10</a:t>
+            </a:fld>
+            <a:endParaRPr lang="es-ES"/>
+          </a:p>
+        </p:txBody>
+      </p:sp>
     </p:spTree>
     <p:extLst>
       <p:ext uri="{BB962C8B-B14F-4D97-AF65-F5344CB8AC3E}">
-        <p14:creationId xmlns:p14="http://schemas.microsoft.com/office/powerpoint/2010/main" val="3357839204"/>
+        <p14:creationId xmlns:p14="http://schemas.microsoft.com/office/powerpoint/2010/main" val="10122730"/>
       </p:ext>
     </p:extLst>
   </p:cSld>
@@ -3922,10 +3962,10 @@
       </p:grpSpPr>
       <p:pic>
         <p:nvPicPr>
-          <p:cNvPr id="2" name="Imagen 1" descr="Un dibujo de una persona&#10;&#10;Descripción generada automáticamente con confianza media">
+          <p:cNvPr id="2" name="Imagen 1" descr="Icono&#10;&#10;Descripción generada automáticamente">
             <a:extLst>
               <a:ext uri="{FF2B5EF4-FFF2-40B4-BE49-F238E27FC236}">
-                <a16:creationId xmlns:a16="http://schemas.microsoft.com/office/drawing/2014/main" id="{9364BEA8-864E-D3B1-E4F2-DD9958EF4180}"/>
+                <a16:creationId xmlns:a16="http://schemas.microsoft.com/office/drawing/2014/main" id="{81DF7DC3-496B-4D85-373E-5064820E8C21}"/>
               </a:ext>
             </a:extLst>
           </p:cNvPr>
@@ -3956,10 +3996,42 @@
           </a:prstGeom>
         </p:spPr>
       </p:pic>
+      <p:sp>
+        <p:nvSpPr>
+          <p:cNvPr id="3" name="Marcador de número de diapositiva 2">
+            <a:extLst>
+              <a:ext uri="{FF2B5EF4-FFF2-40B4-BE49-F238E27FC236}">
+                <a16:creationId xmlns:a16="http://schemas.microsoft.com/office/drawing/2014/main" id="{F15735AF-F04A-59C6-1DF9-EF5417D63E9B}"/>
+              </a:ext>
+            </a:extLst>
+          </p:cNvPr>
+          <p:cNvSpPr>
+            <a:spLocks noGrp="1"/>
+          </p:cNvSpPr>
+          <p:nvPr>
+            <p:ph type="sldNum" sz="quarter" idx="12"/>
+          </p:nvPr>
+        </p:nvSpPr>
+        <p:spPr/>
+        <p:txBody>
+          <a:bodyPr/>
+          <a:lstStyle/>
+          <a:p>
+            <a:pPr>
+              <a:defRPr/>
+            </a:pPr>
+            <a:fld id="{08395586-F03A-48D1-94DF-16B239DF4FB5}" type="slidenum">
+              <a:rPr lang="es-ES" smtClean="0"/>
+              <a:t>11</a:t>
+            </a:fld>
+            <a:endParaRPr lang="es-ES"/>
+          </a:p>
+        </p:txBody>
+      </p:sp>
     </p:spTree>
     <p:extLst>
       <p:ext uri="{BB962C8B-B14F-4D97-AF65-F5344CB8AC3E}">
-        <p14:creationId xmlns:p14="http://schemas.microsoft.com/office/powerpoint/2010/main" val="10122730"/>
+        <p14:creationId xmlns:p14="http://schemas.microsoft.com/office/powerpoint/2010/main" val="574431483"/>
       </p:ext>
     </p:extLst>
   </p:cSld>
@@ -4022,6 +4094,38 @@
           </a:prstGeom>
         </p:spPr>
       </p:pic>
+      <p:sp>
+        <p:nvSpPr>
+          <p:cNvPr id="3" name="Marcador de número de diapositiva 2">
+            <a:extLst>
+              <a:ext uri="{FF2B5EF4-FFF2-40B4-BE49-F238E27FC236}">
+                <a16:creationId xmlns:a16="http://schemas.microsoft.com/office/drawing/2014/main" id="{288B0C7E-9BC8-A334-CD89-03B6F2D6B67E}"/>
+              </a:ext>
+            </a:extLst>
+          </p:cNvPr>
+          <p:cNvSpPr>
+            <a:spLocks noGrp="1"/>
+          </p:cNvSpPr>
+          <p:nvPr>
+            <p:ph type="sldNum" sz="quarter" idx="12"/>
+          </p:nvPr>
+        </p:nvSpPr>
+        <p:spPr/>
+        <p:txBody>
+          <a:bodyPr/>
+          <a:lstStyle/>
+          <a:p>
+            <a:pPr>
+              <a:defRPr/>
+            </a:pPr>
+            <a:fld id="{08395586-F03A-48D1-94DF-16B239DF4FB5}" type="slidenum">
+              <a:rPr lang="es-ES" smtClean="0"/>
+              <a:t>12</a:t>
+            </a:fld>
+            <a:endParaRPr lang="es-ES"/>
+          </a:p>
+        </p:txBody>
+      </p:sp>
     </p:spTree>
     <p:extLst>
       <p:ext uri="{BB962C8B-B14F-4D97-AF65-F5344CB8AC3E}">
@@ -4088,6 +4192,38 @@
           </a:prstGeom>
         </p:spPr>
       </p:pic>
+      <p:sp>
+        <p:nvSpPr>
+          <p:cNvPr id="3" name="Marcador de número de diapositiva 2">
+            <a:extLst>
+              <a:ext uri="{FF2B5EF4-FFF2-40B4-BE49-F238E27FC236}">
+                <a16:creationId xmlns:a16="http://schemas.microsoft.com/office/drawing/2014/main" id="{6AA3558B-DAC5-C0DA-9370-D06377CE7119}"/>
+              </a:ext>
+            </a:extLst>
+          </p:cNvPr>
+          <p:cNvSpPr>
+            <a:spLocks noGrp="1"/>
+          </p:cNvSpPr>
+          <p:nvPr>
+            <p:ph type="sldNum" sz="quarter" idx="12"/>
+          </p:nvPr>
+        </p:nvSpPr>
+        <p:spPr/>
+        <p:txBody>
+          <a:bodyPr/>
+          <a:lstStyle/>
+          <a:p>
+            <a:pPr>
+              <a:defRPr/>
+            </a:pPr>
+            <a:fld id="{08395586-F03A-48D1-94DF-16B239DF4FB5}" type="slidenum">
+              <a:rPr lang="es-ES" smtClean="0"/>
+              <a:t>13</a:t>
+            </a:fld>
+            <a:endParaRPr lang="es-ES"/>
+          </a:p>
+        </p:txBody>
+      </p:sp>
     </p:spTree>
     <p:extLst>
       <p:ext uri="{BB962C8B-B14F-4D97-AF65-F5344CB8AC3E}">
@@ -4102,7 +4238,7 @@
 </file>
 
 <file path=ppt/slides/slide14.xml><?xml version="1.0" encoding="utf-8"?>
-<p:sld xmlns:a="http://schemas.openxmlformats.org/drawingml/2006/main" xmlns:r="http://schemas.openxmlformats.org/officeDocument/2006/relationships" xmlns:p="http://schemas.openxmlformats.org/presentationml/2006/main">
+<p:sld xmlns:a="http://schemas.openxmlformats.org/drawingml/2006/main" xmlns:r="http://schemas.openxmlformats.org/officeDocument/2006/relationships" xmlns:p="http://schemas.openxmlformats.org/presentationml/2006/main" showMasterPhAnim="0">
   <p:cSld>
     <p:spTree>
       <p:nvGrpSpPr>
@@ -4110,7 +4246,7 @@
         <p:cNvGrpSpPr/>
         <p:nvPr/>
       </p:nvGrpSpPr>
-      <p:grpSpPr>
+      <p:grpSpPr bwMode="auto">
         <a:xfrm>
           <a:off x="0" y="0"/>
           <a:ext cx="0" cy="0"/>
@@ -4118,36 +4254,48 @@
           <a:chExt cx="0" cy="0"/>
         </a:xfrm>
       </p:grpSpPr>
+      <p:sp>
+        <p:nvSpPr>
+          <p:cNvPr id="1387642895" name="Slide Number Placeholder 5"/>
+          <p:cNvSpPr>
+            <a:spLocks noGrp="1"/>
+          </p:cNvSpPr>
+          <p:nvPr>
+            <p:ph type="sldNum" sz="quarter" idx="12"/>
+          </p:nvPr>
+        </p:nvSpPr>
+        <p:spPr bwMode="auto"/>
+        <p:txBody>
+          <a:bodyPr/>
+          <a:lstStyle/>
+          <a:p>
+            <a:pPr>
+              <a:defRPr/>
+            </a:pPr>
+            <a:fld id="{CB0B926E-2250-6F6B-31DB-AB052ED04542}" type="slidenum">
+              <a:rPr lang="es-ES"/>
+              <a:t>14</a:t>
+            </a:fld>
+            <a:endParaRPr/>
+          </a:p>
+        </p:txBody>
+      </p:sp>
       <p:pic>
         <p:nvPicPr>
-          <p:cNvPr id="2" name="Imagen 1" descr="Icono&#10;&#10;Descripción generada automáticamente">
-            <a:extLst>
-              <a:ext uri="{FF2B5EF4-FFF2-40B4-BE49-F238E27FC236}">
-                <a16:creationId xmlns:a16="http://schemas.microsoft.com/office/drawing/2014/main" id="{81DF7DC3-496B-4D85-373E-5064820E8C21}"/>
-              </a:ext>
-            </a:extLst>
-          </p:cNvPr>
+          <p:cNvPr id="1561111226" name="Imagen 1561111225"/>
           <p:cNvPicPr>
             <a:picLocks noChangeAspect="1"/>
           </p:cNvPicPr>
           <p:nvPr/>
         </p:nvPicPr>
         <p:blipFill>
-          <a:blip r:embed="rId2">
-            <a:extLst>
-              <a:ext uri="{28A0092B-C50C-407E-A947-70E740481C1C}">
-                <a14:useLocalDpi xmlns:a14="http://schemas.microsoft.com/office/drawing/2010/main" val="0"/>
-              </a:ext>
-            </a:extLst>
-          </a:blip>
-          <a:stretch>
-            <a:fillRect/>
-          </a:stretch>
+          <a:blip r:embed="rId3"/>
+          <a:stretch/>
         </p:blipFill>
-        <p:spPr>
+        <p:spPr bwMode="auto">
           <a:xfrm>
-            <a:off x="3714750" y="1047750"/>
-            <a:ext cx="4762500" cy="4762500"/>
+            <a:off x="2666999" y="0"/>
+            <a:ext cx="6858000" cy="6858000"/>
           </a:xfrm>
           <a:prstGeom prst="rect">
             <a:avLst/>
@@ -4155,11 +4303,6 @@
         </p:spPr>
       </p:pic>
     </p:spTree>
-    <p:extLst>
-      <p:ext uri="{BB962C8B-B14F-4D97-AF65-F5344CB8AC3E}">
-        <p14:creationId xmlns:p14="http://schemas.microsoft.com/office/powerpoint/2010/main" val="574431483"/>
-      </p:ext>
-    </p:extLst>
   </p:cSld>
   <p:clrMapOvr>
     <a:masterClrMapping/>
@@ -4220,6 +4363,38 @@
           </a:prstGeom>
         </p:spPr>
       </p:pic>
+      <p:sp>
+        <p:nvSpPr>
+          <p:cNvPr id="3" name="Marcador de número de diapositiva 2">
+            <a:extLst>
+              <a:ext uri="{FF2B5EF4-FFF2-40B4-BE49-F238E27FC236}">
+                <a16:creationId xmlns:a16="http://schemas.microsoft.com/office/drawing/2014/main" id="{32E78FD8-5245-7775-8322-D8E742DE2DF5}"/>
+              </a:ext>
+            </a:extLst>
+          </p:cNvPr>
+          <p:cNvSpPr>
+            <a:spLocks noGrp="1"/>
+          </p:cNvSpPr>
+          <p:nvPr>
+            <p:ph type="sldNum" sz="quarter" idx="12"/>
+          </p:nvPr>
+        </p:nvSpPr>
+        <p:spPr/>
+        <p:txBody>
+          <a:bodyPr/>
+          <a:lstStyle/>
+          <a:p>
+            <a:pPr>
+              <a:defRPr/>
+            </a:pPr>
+            <a:fld id="{08395586-F03A-48D1-94DF-16B239DF4FB5}" type="slidenum">
+              <a:rPr lang="es-ES" smtClean="0"/>
+              <a:t>15</a:t>
+            </a:fld>
+            <a:endParaRPr lang="es-ES"/>
+          </a:p>
+        </p:txBody>
+      </p:sp>
     </p:spTree>
     <p:extLst>
       <p:ext uri="{BB962C8B-B14F-4D97-AF65-F5344CB8AC3E}">
@@ -4286,6 +4461,38 @@
           </a:prstGeom>
         </p:spPr>
       </p:pic>
+      <p:sp>
+        <p:nvSpPr>
+          <p:cNvPr id="2" name="Marcador de número de diapositiva 1">
+            <a:extLst>
+              <a:ext uri="{FF2B5EF4-FFF2-40B4-BE49-F238E27FC236}">
+                <a16:creationId xmlns:a16="http://schemas.microsoft.com/office/drawing/2014/main" id="{362282C5-D3FF-451D-35BA-148CD405D25E}"/>
+              </a:ext>
+            </a:extLst>
+          </p:cNvPr>
+          <p:cNvSpPr>
+            <a:spLocks noGrp="1"/>
+          </p:cNvSpPr>
+          <p:nvPr>
+            <p:ph type="sldNum" sz="quarter" idx="12"/>
+          </p:nvPr>
+        </p:nvSpPr>
+        <p:spPr/>
+        <p:txBody>
+          <a:bodyPr/>
+          <a:lstStyle/>
+          <a:p>
+            <a:pPr>
+              <a:defRPr/>
+            </a:pPr>
+            <a:fld id="{08395586-F03A-48D1-94DF-16B239DF4FB5}" type="slidenum">
+              <a:rPr lang="es-ES" smtClean="0"/>
+              <a:t>16</a:t>
+            </a:fld>
+            <a:endParaRPr lang="es-ES"/>
+          </a:p>
+        </p:txBody>
+      </p:sp>
     </p:spTree>
     <p:extLst>
       <p:ext uri="{BB962C8B-B14F-4D97-AF65-F5344CB8AC3E}">
@@ -4352,6 +4559,38 @@
           </a:prstGeom>
         </p:spPr>
       </p:pic>
+      <p:sp>
+        <p:nvSpPr>
+          <p:cNvPr id="3" name="Marcador de número de diapositiva 2">
+            <a:extLst>
+              <a:ext uri="{FF2B5EF4-FFF2-40B4-BE49-F238E27FC236}">
+                <a16:creationId xmlns:a16="http://schemas.microsoft.com/office/drawing/2014/main" id="{7D5BE875-A14E-8F55-FF2D-5B5E6BE99D07}"/>
+              </a:ext>
+            </a:extLst>
+          </p:cNvPr>
+          <p:cNvSpPr>
+            <a:spLocks noGrp="1"/>
+          </p:cNvSpPr>
+          <p:nvPr>
+            <p:ph type="sldNum" sz="quarter" idx="12"/>
+          </p:nvPr>
+        </p:nvSpPr>
+        <p:spPr/>
+        <p:txBody>
+          <a:bodyPr/>
+          <a:lstStyle/>
+          <a:p>
+            <a:pPr>
+              <a:defRPr/>
+            </a:pPr>
+            <a:fld id="{08395586-F03A-48D1-94DF-16B239DF4FB5}" type="slidenum">
+              <a:rPr lang="es-ES" smtClean="0"/>
+              <a:t>17</a:t>
+            </a:fld>
+            <a:endParaRPr lang="es-ES"/>
+          </a:p>
+        </p:txBody>
+      </p:sp>
     </p:spTree>
     <p:extLst>
       <p:ext uri="{BB962C8B-B14F-4D97-AF65-F5344CB8AC3E}">
@@ -4418,6 +4657,38 @@
           </a:prstGeom>
         </p:spPr>
       </p:pic>
+      <p:sp>
+        <p:nvSpPr>
+          <p:cNvPr id="3" name="Marcador de número de diapositiva 2">
+            <a:extLst>
+              <a:ext uri="{FF2B5EF4-FFF2-40B4-BE49-F238E27FC236}">
+                <a16:creationId xmlns:a16="http://schemas.microsoft.com/office/drawing/2014/main" id="{8093547A-E97E-E61B-493F-BBCA4046524D}"/>
+              </a:ext>
+            </a:extLst>
+          </p:cNvPr>
+          <p:cNvSpPr>
+            <a:spLocks noGrp="1"/>
+          </p:cNvSpPr>
+          <p:nvPr>
+            <p:ph type="sldNum" sz="quarter" idx="12"/>
+          </p:nvPr>
+        </p:nvSpPr>
+        <p:spPr/>
+        <p:txBody>
+          <a:bodyPr/>
+          <a:lstStyle/>
+          <a:p>
+            <a:pPr>
+              <a:defRPr/>
+            </a:pPr>
+            <a:fld id="{08395586-F03A-48D1-94DF-16B239DF4FB5}" type="slidenum">
+              <a:rPr lang="es-ES" smtClean="0"/>
+              <a:t>18</a:t>
+            </a:fld>
+            <a:endParaRPr lang="es-ES"/>
+          </a:p>
+        </p:txBody>
+      </p:sp>
     </p:spTree>
     <p:extLst>
       <p:ext uri="{BB962C8B-B14F-4D97-AF65-F5344CB8AC3E}">
@@ -4484,6 +4755,38 @@
           </a:prstGeom>
         </p:spPr>
       </p:pic>
+      <p:sp>
+        <p:nvSpPr>
+          <p:cNvPr id="3" name="Marcador de número de diapositiva 2">
+            <a:extLst>
+              <a:ext uri="{FF2B5EF4-FFF2-40B4-BE49-F238E27FC236}">
+                <a16:creationId xmlns:a16="http://schemas.microsoft.com/office/drawing/2014/main" id="{F63F18F5-C72D-2DF8-45AA-C30C2EBDCA3C}"/>
+              </a:ext>
+            </a:extLst>
+          </p:cNvPr>
+          <p:cNvSpPr>
+            <a:spLocks noGrp="1"/>
+          </p:cNvSpPr>
+          <p:nvPr>
+            <p:ph type="sldNum" sz="quarter" idx="12"/>
+          </p:nvPr>
+        </p:nvSpPr>
+        <p:spPr/>
+        <p:txBody>
+          <a:bodyPr/>
+          <a:lstStyle/>
+          <a:p>
+            <a:pPr>
+              <a:defRPr/>
+            </a:pPr>
+            <a:fld id="{08395586-F03A-48D1-94DF-16B239DF4FB5}" type="slidenum">
+              <a:rPr lang="es-ES" smtClean="0"/>
+              <a:t>19</a:t>
+            </a:fld>
+            <a:endParaRPr lang="es-ES"/>
+          </a:p>
+        </p:txBody>
+      </p:sp>
     </p:spTree>
     <p:extLst>
       <p:ext uri="{BB962C8B-B14F-4D97-AF65-F5344CB8AC3E}">
@@ -4498,7 +4801,7 @@
 </file>
 
 <file path=ppt/slides/slide2.xml><?xml version="1.0" encoding="utf-8"?>
-<p:sld xmlns:a="http://schemas.openxmlformats.org/drawingml/2006/main" xmlns:r="http://schemas.openxmlformats.org/officeDocument/2006/relationships" xmlns:p="http://schemas.openxmlformats.org/presentationml/2006/main" showMasterPhAnim="0">
+<p:sld xmlns:a="http://schemas.openxmlformats.org/drawingml/2006/main" xmlns:r="http://schemas.openxmlformats.org/officeDocument/2006/relationships" xmlns:p="http://schemas.openxmlformats.org/presentationml/2006/main">
   <p:cSld>
     <p:spTree>
       <p:nvGrpSpPr>
@@ -4506,7 +4809,7 @@
         <p:cNvGrpSpPr/>
         <p:nvPr/>
       </p:nvGrpSpPr>
-      <p:grpSpPr bwMode="auto">
+      <p:grpSpPr>
         <a:xfrm>
           <a:off x="0" y="0"/>
           <a:ext cx="0" cy="0"/>
@@ -4514,55 +4817,80 @@
           <a:chExt cx="0" cy="0"/>
         </a:xfrm>
       </p:grpSpPr>
-      <p:sp>
-        <p:nvSpPr>
-          <p:cNvPr id="1387642895" name="Slide Number Placeholder 5"/>
-          <p:cNvSpPr>
-            <a:spLocks noGrp="1"/>
-          </p:cNvSpPr>
-          <p:nvPr>
-            <p:ph type="sldNum" sz="quarter" idx="12"/>
-          </p:nvPr>
-        </p:nvSpPr>
-        <p:spPr bwMode="auto"/>
-        <p:txBody>
-          <a:bodyPr/>
-          <a:lstStyle/>
-          <a:p>
-            <a:pPr>
-              <a:defRPr/>
-            </a:pPr>
-            <a:fld id="{CB0B926E-2250-6F6B-31DB-AB052ED04542}" type="slidenum">
-              <a:rPr lang="es-ES"/>
-              <a:t>2</a:t>
-            </a:fld>
-            <a:endParaRPr/>
-          </a:p>
-        </p:txBody>
-      </p:sp>
       <p:pic>
         <p:nvPicPr>
-          <p:cNvPr id="1561111226" name="Imagen 1561111225"/>
+          <p:cNvPr id="58" name="Imagen 57" descr="Imagen que contiene Forma&#10;&#10;Descripción generada automáticamente">
+            <a:extLst>
+              <a:ext uri="{FF2B5EF4-FFF2-40B4-BE49-F238E27FC236}">
+                <a16:creationId xmlns:a16="http://schemas.microsoft.com/office/drawing/2014/main" id="{171BC32B-AE07-2CF9-8A49-58975B625639}"/>
+              </a:ext>
+            </a:extLst>
+          </p:cNvPr>
           <p:cNvPicPr>
             <a:picLocks noChangeAspect="1"/>
           </p:cNvPicPr>
           <p:nvPr/>
         </p:nvPicPr>
         <p:blipFill>
-          <a:blip r:embed="rId3"/>
-          <a:stretch/>
+          <a:blip r:embed="rId2">
+            <a:extLst>
+              <a:ext uri="{28A0092B-C50C-407E-A947-70E740481C1C}">
+                <a14:useLocalDpi xmlns:a14="http://schemas.microsoft.com/office/drawing/2010/main" val="0"/>
+              </a:ext>
+            </a:extLst>
+          </a:blip>
+          <a:stretch>
+            <a:fillRect/>
+          </a:stretch>
         </p:blipFill>
-        <p:spPr bwMode="auto">
+        <p:spPr>
           <a:xfrm>
-            <a:off x="2666999" y="0"/>
-            <a:ext cx="6858000" cy="6858000"/>
+            <a:off x="3714750" y="1047750"/>
+            <a:ext cx="4762500" cy="4762500"/>
           </a:xfrm>
           <a:prstGeom prst="rect">
             <a:avLst/>
           </a:prstGeom>
         </p:spPr>
       </p:pic>
+      <p:sp>
+        <p:nvSpPr>
+          <p:cNvPr id="2" name="Marcador de número de diapositiva 1">
+            <a:extLst>
+              <a:ext uri="{FF2B5EF4-FFF2-40B4-BE49-F238E27FC236}">
+                <a16:creationId xmlns:a16="http://schemas.microsoft.com/office/drawing/2014/main" id="{5406E727-7340-6D6B-FC7E-586122D9D96A}"/>
+              </a:ext>
+            </a:extLst>
+          </p:cNvPr>
+          <p:cNvSpPr>
+            <a:spLocks noGrp="1"/>
+          </p:cNvSpPr>
+          <p:nvPr>
+            <p:ph type="sldNum" sz="quarter" idx="12"/>
+          </p:nvPr>
+        </p:nvSpPr>
+        <p:spPr/>
+        <p:txBody>
+          <a:bodyPr/>
+          <a:lstStyle/>
+          <a:p>
+            <a:pPr>
+              <a:defRPr/>
+            </a:pPr>
+            <a:fld id="{08395586-F03A-48D1-94DF-16B239DF4FB5}" type="slidenum">
+              <a:rPr lang="es-ES" smtClean="0"/>
+              <a:t>2</a:t>
+            </a:fld>
+            <a:endParaRPr lang="es-ES" dirty="0"/>
+          </a:p>
+        </p:txBody>
+      </p:sp>
     </p:spTree>
+    <p:extLst>
+      <p:ext uri="{BB962C8B-B14F-4D97-AF65-F5344CB8AC3E}">
+        <p14:creationId xmlns:p14="http://schemas.microsoft.com/office/powerpoint/2010/main" val="2350004838"/>
+      </p:ext>
+    </p:extLst>
   </p:cSld>
   <p:clrMapOvr>
     <a:masterClrMapping/>
@@ -4623,6 +4951,38 @@
           </a:prstGeom>
         </p:spPr>
       </p:pic>
+      <p:sp>
+        <p:nvSpPr>
+          <p:cNvPr id="3" name="Marcador de número de diapositiva 2">
+            <a:extLst>
+              <a:ext uri="{FF2B5EF4-FFF2-40B4-BE49-F238E27FC236}">
+                <a16:creationId xmlns:a16="http://schemas.microsoft.com/office/drawing/2014/main" id="{B4AF625F-4B1A-E7FB-06E6-9A2A5AF510D4}"/>
+              </a:ext>
+            </a:extLst>
+          </p:cNvPr>
+          <p:cNvSpPr>
+            <a:spLocks noGrp="1"/>
+          </p:cNvSpPr>
+          <p:nvPr>
+            <p:ph type="sldNum" sz="quarter" idx="12"/>
+          </p:nvPr>
+        </p:nvSpPr>
+        <p:spPr/>
+        <p:txBody>
+          <a:bodyPr/>
+          <a:lstStyle/>
+          <a:p>
+            <a:pPr>
+              <a:defRPr/>
+            </a:pPr>
+            <a:fld id="{08395586-F03A-48D1-94DF-16B239DF4FB5}" type="slidenum">
+              <a:rPr lang="es-ES" smtClean="0"/>
+              <a:t>20</a:t>
+            </a:fld>
+            <a:endParaRPr lang="es-ES"/>
+          </a:p>
+        </p:txBody>
+      </p:sp>
     </p:spTree>
     <p:extLst>
       <p:ext uri="{BB962C8B-B14F-4D97-AF65-F5344CB8AC3E}">
@@ -4689,6 +5049,38 @@
           </a:prstGeom>
         </p:spPr>
       </p:pic>
+      <p:sp>
+        <p:nvSpPr>
+          <p:cNvPr id="3" name="Marcador de número de diapositiva 2">
+            <a:extLst>
+              <a:ext uri="{FF2B5EF4-FFF2-40B4-BE49-F238E27FC236}">
+                <a16:creationId xmlns:a16="http://schemas.microsoft.com/office/drawing/2014/main" id="{FC171BAC-F501-7BD1-47B3-42159C3F1860}"/>
+              </a:ext>
+            </a:extLst>
+          </p:cNvPr>
+          <p:cNvSpPr>
+            <a:spLocks noGrp="1"/>
+          </p:cNvSpPr>
+          <p:nvPr>
+            <p:ph type="sldNum" sz="quarter" idx="12"/>
+          </p:nvPr>
+        </p:nvSpPr>
+        <p:spPr/>
+        <p:txBody>
+          <a:bodyPr/>
+          <a:lstStyle/>
+          <a:p>
+            <a:pPr>
+              <a:defRPr/>
+            </a:pPr>
+            <a:fld id="{08395586-F03A-48D1-94DF-16B239DF4FB5}" type="slidenum">
+              <a:rPr lang="es-ES" smtClean="0"/>
+              <a:t>21</a:t>
+            </a:fld>
+            <a:endParaRPr lang="es-ES"/>
+          </a:p>
+        </p:txBody>
+      </p:sp>
     </p:spTree>
     <p:extLst>
       <p:ext uri="{BB962C8B-B14F-4D97-AF65-F5344CB8AC3E}">
@@ -4755,6 +5147,38 @@
           </a:prstGeom>
         </p:spPr>
       </p:pic>
+      <p:sp>
+        <p:nvSpPr>
+          <p:cNvPr id="3" name="Marcador de número de diapositiva 2">
+            <a:extLst>
+              <a:ext uri="{FF2B5EF4-FFF2-40B4-BE49-F238E27FC236}">
+                <a16:creationId xmlns:a16="http://schemas.microsoft.com/office/drawing/2014/main" id="{A77C1CEB-DFEA-AC54-B527-D3626408E5EF}"/>
+              </a:ext>
+            </a:extLst>
+          </p:cNvPr>
+          <p:cNvSpPr>
+            <a:spLocks noGrp="1"/>
+          </p:cNvSpPr>
+          <p:nvPr>
+            <p:ph type="sldNum" sz="quarter" idx="12"/>
+          </p:nvPr>
+        </p:nvSpPr>
+        <p:spPr/>
+        <p:txBody>
+          <a:bodyPr/>
+          <a:lstStyle/>
+          <a:p>
+            <a:pPr>
+              <a:defRPr/>
+            </a:pPr>
+            <a:fld id="{08395586-F03A-48D1-94DF-16B239DF4FB5}" type="slidenum">
+              <a:rPr lang="es-ES" smtClean="0"/>
+              <a:t>22</a:t>
+            </a:fld>
+            <a:endParaRPr lang="es-ES"/>
+          </a:p>
+        </p:txBody>
+      </p:sp>
     </p:spTree>
     <p:extLst>
       <p:ext uri="{BB962C8B-B14F-4D97-AF65-F5344CB8AC3E}">
@@ -4821,6 +5245,38 @@
           </a:prstGeom>
         </p:spPr>
       </p:pic>
+      <p:sp>
+        <p:nvSpPr>
+          <p:cNvPr id="3" name="Marcador de número de diapositiva 2">
+            <a:extLst>
+              <a:ext uri="{FF2B5EF4-FFF2-40B4-BE49-F238E27FC236}">
+                <a16:creationId xmlns:a16="http://schemas.microsoft.com/office/drawing/2014/main" id="{28499508-592B-2AE9-FA70-8AEE5A81792C}"/>
+              </a:ext>
+            </a:extLst>
+          </p:cNvPr>
+          <p:cNvSpPr>
+            <a:spLocks noGrp="1"/>
+          </p:cNvSpPr>
+          <p:nvPr>
+            <p:ph type="sldNum" sz="quarter" idx="12"/>
+          </p:nvPr>
+        </p:nvSpPr>
+        <p:spPr/>
+        <p:txBody>
+          <a:bodyPr/>
+          <a:lstStyle/>
+          <a:p>
+            <a:pPr>
+              <a:defRPr/>
+            </a:pPr>
+            <a:fld id="{08395586-F03A-48D1-94DF-16B239DF4FB5}" type="slidenum">
+              <a:rPr lang="es-ES" smtClean="0"/>
+              <a:t>23</a:t>
+            </a:fld>
+            <a:endParaRPr lang="es-ES"/>
+          </a:p>
+        </p:txBody>
+      </p:sp>
     </p:spTree>
     <p:extLst>
       <p:ext uri="{BB962C8B-B14F-4D97-AF65-F5344CB8AC3E}">
@@ -4887,6 +5343,38 @@
           </a:prstGeom>
         </p:spPr>
       </p:pic>
+      <p:sp>
+        <p:nvSpPr>
+          <p:cNvPr id="3" name="Marcador de número de diapositiva 2">
+            <a:extLst>
+              <a:ext uri="{FF2B5EF4-FFF2-40B4-BE49-F238E27FC236}">
+                <a16:creationId xmlns:a16="http://schemas.microsoft.com/office/drawing/2014/main" id="{458CFA2D-7143-0B0D-44FC-2A713471ECA2}"/>
+              </a:ext>
+            </a:extLst>
+          </p:cNvPr>
+          <p:cNvSpPr>
+            <a:spLocks noGrp="1"/>
+          </p:cNvSpPr>
+          <p:nvPr>
+            <p:ph type="sldNum" sz="quarter" idx="12"/>
+          </p:nvPr>
+        </p:nvSpPr>
+        <p:spPr/>
+        <p:txBody>
+          <a:bodyPr/>
+          <a:lstStyle/>
+          <a:p>
+            <a:pPr>
+              <a:defRPr/>
+            </a:pPr>
+            <a:fld id="{08395586-F03A-48D1-94DF-16B239DF4FB5}" type="slidenum">
+              <a:rPr lang="es-ES" smtClean="0"/>
+              <a:t>24</a:t>
+            </a:fld>
+            <a:endParaRPr lang="es-ES"/>
+          </a:p>
+        </p:txBody>
+      </p:sp>
     </p:spTree>
     <p:extLst>
       <p:ext uri="{BB962C8B-B14F-4D97-AF65-F5344CB8AC3E}">
@@ -4953,6 +5441,38 @@
           </a:prstGeom>
         </p:spPr>
       </p:pic>
+      <p:sp>
+        <p:nvSpPr>
+          <p:cNvPr id="3" name="Marcador de número de diapositiva 2">
+            <a:extLst>
+              <a:ext uri="{FF2B5EF4-FFF2-40B4-BE49-F238E27FC236}">
+                <a16:creationId xmlns:a16="http://schemas.microsoft.com/office/drawing/2014/main" id="{876D62D0-A2F9-6188-1026-1DA0F4507FAE}"/>
+              </a:ext>
+            </a:extLst>
+          </p:cNvPr>
+          <p:cNvSpPr>
+            <a:spLocks noGrp="1"/>
+          </p:cNvSpPr>
+          <p:nvPr>
+            <p:ph type="sldNum" sz="quarter" idx="12"/>
+          </p:nvPr>
+        </p:nvSpPr>
+        <p:spPr/>
+        <p:txBody>
+          <a:bodyPr/>
+          <a:lstStyle/>
+          <a:p>
+            <a:pPr>
+              <a:defRPr/>
+            </a:pPr>
+            <a:fld id="{08395586-F03A-48D1-94DF-16B239DF4FB5}" type="slidenum">
+              <a:rPr lang="es-ES" smtClean="0"/>
+              <a:t>25</a:t>
+            </a:fld>
+            <a:endParaRPr lang="es-ES"/>
+          </a:p>
+        </p:txBody>
+      </p:sp>
     </p:spTree>
     <p:extLst>
       <p:ext uri="{BB962C8B-B14F-4D97-AF65-F5344CB8AC3E}">
@@ -5019,6 +5539,38 @@
           </a:prstGeom>
         </p:spPr>
       </p:pic>
+      <p:sp>
+        <p:nvSpPr>
+          <p:cNvPr id="3" name="Marcador de número de diapositiva 2">
+            <a:extLst>
+              <a:ext uri="{FF2B5EF4-FFF2-40B4-BE49-F238E27FC236}">
+                <a16:creationId xmlns:a16="http://schemas.microsoft.com/office/drawing/2014/main" id="{66F430AB-64C6-4F02-1499-717AD017DD64}"/>
+              </a:ext>
+            </a:extLst>
+          </p:cNvPr>
+          <p:cNvSpPr>
+            <a:spLocks noGrp="1"/>
+          </p:cNvSpPr>
+          <p:nvPr>
+            <p:ph type="sldNum" sz="quarter" idx="12"/>
+          </p:nvPr>
+        </p:nvSpPr>
+        <p:spPr/>
+        <p:txBody>
+          <a:bodyPr/>
+          <a:lstStyle/>
+          <a:p>
+            <a:pPr>
+              <a:defRPr/>
+            </a:pPr>
+            <a:fld id="{08395586-F03A-48D1-94DF-16B239DF4FB5}" type="slidenum">
+              <a:rPr lang="es-ES" smtClean="0"/>
+              <a:t>26</a:t>
+            </a:fld>
+            <a:endParaRPr lang="es-ES"/>
+          </a:p>
+        </p:txBody>
+      </p:sp>
     </p:spTree>
     <p:extLst>
       <p:ext uri="{BB962C8B-B14F-4D97-AF65-F5344CB8AC3E}">
@@ -5085,6 +5637,38 @@
           </a:prstGeom>
         </p:spPr>
       </p:pic>
+      <p:sp>
+        <p:nvSpPr>
+          <p:cNvPr id="3" name="Marcador de número de diapositiva 2">
+            <a:extLst>
+              <a:ext uri="{FF2B5EF4-FFF2-40B4-BE49-F238E27FC236}">
+                <a16:creationId xmlns:a16="http://schemas.microsoft.com/office/drawing/2014/main" id="{7BE446A5-E566-3E99-2D4C-BA3496372901}"/>
+              </a:ext>
+            </a:extLst>
+          </p:cNvPr>
+          <p:cNvSpPr>
+            <a:spLocks noGrp="1"/>
+          </p:cNvSpPr>
+          <p:nvPr>
+            <p:ph type="sldNum" sz="quarter" idx="12"/>
+          </p:nvPr>
+        </p:nvSpPr>
+        <p:spPr/>
+        <p:txBody>
+          <a:bodyPr/>
+          <a:lstStyle/>
+          <a:p>
+            <a:pPr>
+              <a:defRPr/>
+            </a:pPr>
+            <a:fld id="{08395586-F03A-48D1-94DF-16B239DF4FB5}" type="slidenum">
+              <a:rPr lang="es-ES" smtClean="0"/>
+              <a:t>27</a:t>
+            </a:fld>
+            <a:endParaRPr lang="es-ES"/>
+          </a:p>
+        </p:txBody>
+      </p:sp>
     </p:spTree>
     <p:extLst>
       <p:ext uri="{BB962C8B-B14F-4D97-AF65-F5344CB8AC3E}">
@@ -5151,6 +5735,38 @@
           </a:prstGeom>
         </p:spPr>
       </p:pic>
+      <p:sp>
+        <p:nvSpPr>
+          <p:cNvPr id="3" name="Marcador de número de diapositiva 2">
+            <a:extLst>
+              <a:ext uri="{FF2B5EF4-FFF2-40B4-BE49-F238E27FC236}">
+                <a16:creationId xmlns:a16="http://schemas.microsoft.com/office/drawing/2014/main" id="{7C462DB1-5EA4-67E2-5579-9E5455A8F4CE}"/>
+              </a:ext>
+            </a:extLst>
+          </p:cNvPr>
+          <p:cNvSpPr>
+            <a:spLocks noGrp="1"/>
+          </p:cNvSpPr>
+          <p:nvPr>
+            <p:ph type="sldNum" sz="quarter" idx="12"/>
+          </p:nvPr>
+        </p:nvSpPr>
+        <p:spPr/>
+        <p:txBody>
+          <a:bodyPr/>
+          <a:lstStyle/>
+          <a:p>
+            <a:pPr>
+              <a:defRPr/>
+            </a:pPr>
+            <a:fld id="{08395586-F03A-48D1-94DF-16B239DF4FB5}" type="slidenum">
+              <a:rPr lang="es-ES" smtClean="0"/>
+              <a:t>28</a:t>
+            </a:fld>
+            <a:endParaRPr lang="es-ES"/>
+          </a:p>
+        </p:txBody>
+      </p:sp>
     </p:spTree>
     <p:extLst>
       <p:ext uri="{BB962C8B-B14F-4D97-AF65-F5344CB8AC3E}">
@@ -5217,6 +5833,38 @@
           </a:prstGeom>
         </p:spPr>
       </p:pic>
+      <p:sp>
+        <p:nvSpPr>
+          <p:cNvPr id="3" name="Marcador de número de diapositiva 2">
+            <a:extLst>
+              <a:ext uri="{FF2B5EF4-FFF2-40B4-BE49-F238E27FC236}">
+                <a16:creationId xmlns:a16="http://schemas.microsoft.com/office/drawing/2014/main" id="{A2AE6C32-5437-9450-1A35-07EB0C61B56E}"/>
+              </a:ext>
+            </a:extLst>
+          </p:cNvPr>
+          <p:cNvSpPr>
+            <a:spLocks noGrp="1"/>
+          </p:cNvSpPr>
+          <p:nvPr>
+            <p:ph type="sldNum" sz="quarter" idx="12"/>
+          </p:nvPr>
+        </p:nvSpPr>
+        <p:spPr/>
+        <p:txBody>
+          <a:bodyPr/>
+          <a:lstStyle/>
+          <a:p>
+            <a:pPr>
+              <a:defRPr/>
+            </a:pPr>
+            <a:fld id="{08395586-F03A-48D1-94DF-16B239DF4FB5}" type="slidenum">
+              <a:rPr lang="es-ES" smtClean="0"/>
+              <a:t>29</a:t>
+            </a:fld>
+            <a:endParaRPr lang="es-ES"/>
+          </a:p>
+        </p:txBody>
+      </p:sp>
     </p:spTree>
     <p:extLst>
       <p:ext uri="{BB962C8B-B14F-4D97-AF65-F5344CB8AC3E}">
@@ -5249,10 +5897,10 @@
       </p:grpSpPr>
       <p:pic>
         <p:nvPicPr>
-          <p:cNvPr id="58" name="Imagen 57" descr="Imagen que contiene Forma&#10;&#10;Descripción generada automáticamente">
+          <p:cNvPr id="2" name="Imagen 1" descr="Imagen que contiene Icono&#10;&#10;Descripción generada automáticamente">
             <a:extLst>
               <a:ext uri="{FF2B5EF4-FFF2-40B4-BE49-F238E27FC236}">
-                <a16:creationId xmlns:a16="http://schemas.microsoft.com/office/drawing/2014/main" id="{171BC32B-AE07-2CF9-8A49-58975B625639}"/>
+                <a16:creationId xmlns:a16="http://schemas.microsoft.com/office/drawing/2014/main" id="{DA6372CB-2000-0567-7FC6-DAE631FB8105}"/>
               </a:ext>
             </a:extLst>
           </p:cNvPr>
@@ -5283,10 +5931,42 @@
           </a:prstGeom>
         </p:spPr>
       </p:pic>
+      <p:sp>
+        <p:nvSpPr>
+          <p:cNvPr id="3" name="Marcador de número de diapositiva 2">
+            <a:extLst>
+              <a:ext uri="{FF2B5EF4-FFF2-40B4-BE49-F238E27FC236}">
+                <a16:creationId xmlns:a16="http://schemas.microsoft.com/office/drawing/2014/main" id="{11A02137-436C-1447-F836-15C4356A7A32}"/>
+              </a:ext>
+            </a:extLst>
+          </p:cNvPr>
+          <p:cNvSpPr>
+            <a:spLocks noGrp="1"/>
+          </p:cNvSpPr>
+          <p:nvPr>
+            <p:ph type="sldNum" sz="quarter" idx="12"/>
+          </p:nvPr>
+        </p:nvSpPr>
+        <p:spPr/>
+        <p:txBody>
+          <a:bodyPr/>
+          <a:lstStyle/>
+          <a:p>
+            <a:pPr>
+              <a:defRPr/>
+            </a:pPr>
+            <a:fld id="{08395586-F03A-48D1-94DF-16B239DF4FB5}" type="slidenum">
+              <a:rPr lang="es-ES" smtClean="0"/>
+              <a:t>3</a:t>
+            </a:fld>
+            <a:endParaRPr lang="es-ES"/>
+          </a:p>
+        </p:txBody>
+      </p:sp>
     </p:spTree>
     <p:extLst>
       <p:ext uri="{BB962C8B-B14F-4D97-AF65-F5344CB8AC3E}">
-        <p14:creationId xmlns:p14="http://schemas.microsoft.com/office/powerpoint/2010/main" val="2350004838"/>
+        <p14:creationId xmlns:p14="http://schemas.microsoft.com/office/powerpoint/2010/main" val="3357839204"/>
       </p:ext>
     </p:extLst>
   </p:cSld>
@@ -5349,6 +6029,38 @@
           </a:prstGeom>
         </p:spPr>
       </p:pic>
+      <p:sp>
+        <p:nvSpPr>
+          <p:cNvPr id="3" name="Marcador de número de diapositiva 2">
+            <a:extLst>
+              <a:ext uri="{FF2B5EF4-FFF2-40B4-BE49-F238E27FC236}">
+                <a16:creationId xmlns:a16="http://schemas.microsoft.com/office/drawing/2014/main" id="{1DD0969D-95BE-1A33-FED4-F0536CC394B9}"/>
+              </a:ext>
+            </a:extLst>
+          </p:cNvPr>
+          <p:cNvSpPr>
+            <a:spLocks noGrp="1"/>
+          </p:cNvSpPr>
+          <p:nvPr>
+            <p:ph type="sldNum" sz="quarter" idx="12"/>
+          </p:nvPr>
+        </p:nvSpPr>
+        <p:spPr/>
+        <p:txBody>
+          <a:bodyPr/>
+          <a:lstStyle/>
+          <a:p>
+            <a:pPr>
+              <a:defRPr/>
+            </a:pPr>
+            <a:fld id="{08395586-F03A-48D1-94DF-16B239DF4FB5}" type="slidenum">
+              <a:rPr lang="es-ES" smtClean="0"/>
+              <a:t>30</a:t>
+            </a:fld>
+            <a:endParaRPr lang="es-ES" dirty="0"/>
+          </a:p>
+        </p:txBody>
+      </p:sp>
     </p:spTree>
     <p:extLst>
       <p:ext uri="{BB962C8B-B14F-4D97-AF65-F5344CB8AC3E}">
@@ -5415,6 +6127,38 @@
           </a:prstGeom>
         </p:spPr>
       </p:pic>
+      <p:sp>
+        <p:nvSpPr>
+          <p:cNvPr id="3" name="Marcador de número de diapositiva 2">
+            <a:extLst>
+              <a:ext uri="{FF2B5EF4-FFF2-40B4-BE49-F238E27FC236}">
+                <a16:creationId xmlns:a16="http://schemas.microsoft.com/office/drawing/2014/main" id="{75BCC52E-DC82-4995-887D-98DEE86CDB5C}"/>
+              </a:ext>
+            </a:extLst>
+          </p:cNvPr>
+          <p:cNvSpPr>
+            <a:spLocks noGrp="1"/>
+          </p:cNvSpPr>
+          <p:nvPr>
+            <p:ph type="sldNum" sz="quarter" idx="12"/>
+          </p:nvPr>
+        </p:nvSpPr>
+        <p:spPr/>
+        <p:txBody>
+          <a:bodyPr/>
+          <a:lstStyle/>
+          <a:p>
+            <a:pPr>
+              <a:defRPr/>
+            </a:pPr>
+            <a:fld id="{08395586-F03A-48D1-94DF-16B239DF4FB5}" type="slidenum">
+              <a:rPr lang="es-ES" smtClean="0"/>
+              <a:t>4</a:t>
+            </a:fld>
+            <a:endParaRPr lang="es-ES"/>
+          </a:p>
+        </p:txBody>
+      </p:sp>
     </p:spTree>
     <p:extLst>
       <p:ext uri="{BB962C8B-B14F-4D97-AF65-F5344CB8AC3E}">
@@ -5447,10 +6191,10 @@
       </p:grpSpPr>
       <p:pic>
         <p:nvPicPr>
-          <p:cNvPr id="2" name="Imagen 1" descr="Un dibujo de un perro&#10;&#10;Descripción generada automáticamente con confianza media">
+          <p:cNvPr id="2" name="Imagen 1" descr="Imagen que contiene Rectángulo&#10;&#10;Descripción generada automáticamente">
             <a:extLst>
               <a:ext uri="{FF2B5EF4-FFF2-40B4-BE49-F238E27FC236}">
-                <a16:creationId xmlns:a16="http://schemas.microsoft.com/office/drawing/2014/main" id="{565D1A3F-FF44-B8F5-3A73-019415A1693F}"/>
+                <a16:creationId xmlns:a16="http://schemas.microsoft.com/office/drawing/2014/main" id="{B7F6F837-5CDC-378B-0F7D-024A3C248596}"/>
               </a:ext>
             </a:extLst>
           </p:cNvPr>
@@ -5481,10 +6225,42 @@
           </a:prstGeom>
         </p:spPr>
       </p:pic>
+      <p:sp>
+        <p:nvSpPr>
+          <p:cNvPr id="3" name="Marcador de número de diapositiva 2">
+            <a:extLst>
+              <a:ext uri="{FF2B5EF4-FFF2-40B4-BE49-F238E27FC236}">
+                <a16:creationId xmlns:a16="http://schemas.microsoft.com/office/drawing/2014/main" id="{DCC72716-845D-789B-DF1E-49B4A6A42C17}"/>
+              </a:ext>
+            </a:extLst>
+          </p:cNvPr>
+          <p:cNvSpPr>
+            <a:spLocks noGrp="1"/>
+          </p:cNvSpPr>
+          <p:nvPr>
+            <p:ph type="sldNum" sz="quarter" idx="12"/>
+          </p:nvPr>
+        </p:nvSpPr>
+        <p:spPr/>
+        <p:txBody>
+          <a:bodyPr/>
+          <a:lstStyle/>
+          <a:p>
+            <a:pPr>
+              <a:defRPr/>
+            </a:pPr>
+            <a:fld id="{08395586-F03A-48D1-94DF-16B239DF4FB5}" type="slidenum">
+              <a:rPr lang="es-ES" smtClean="0"/>
+              <a:t>5</a:t>
+            </a:fld>
+            <a:endParaRPr lang="es-ES"/>
+          </a:p>
+        </p:txBody>
+      </p:sp>
     </p:spTree>
     <p:extLst>
       <p:ext uri="{BB962C8B-B14F-4D97-AF65-F5344CB8AC3E}">
-        <p14:creationId xmlns:p14="http://schemas.microsoft.com/office/powerpoint/2010/main" val="1326012889"/>
+        <p14:creationId xmlns:p14="http://schemas.microsoft.com/office/powerpoint/2010/main" val="2481264377"/>
       </p:ext>
     </p:extLst>
   </p:cSld>
@@ -5547,6 +6323,38 @@
           </a:prstGeom>
         </p:spPr>
       </p:pic>
+      <p:sp>
+        <p:nvSpPr>
+          <p:cNvPr id="3" name="Marcador de número de diapositiva 2">
+            <a:extLst>
+              <a:ext uri="{FF2B5EF4-FFF2-40B4-BE49-F238E27FC236}">
+                <a16:creationId xmlns:a16="http://schemas.microsoft.com/office/drawing/2014/main" id="{3117ED40-F003-ED3C-F905-040A30B4D56E}"/>
+              </a:ext>
+            </a:extLst>
+          </p:cNvPr>
+          <p:cNvSpPr>
+            <a:spLocks noGrp="1"/>
+          </p:cNvSpPr>
+          <p:nvPr>
+            <p:ph type="sldNum" sz="quarter" idx="12"/>
+          </p:nvPr>
+        </p:nvSpPr>
+        <p:spPr/>
+        <p:txBody>
+          <a:bodyPr/>
+          <a:lstStyle/>
+          <a:p>
+            <a:pPr>
+              <a:defRPr/>
+            </a:pPr>
+            <a:fld id="{08395586-F03A-48D1-94DF-16B239DF4FB5}" type="slidenum">
+              <a:rPr lang="es-ES" smtClean="0"/>
+              <a:t>6</a:t>
+            </a:fld>
+            <a:endParaRPr lang="es-ES"/>
+          </a:p>
+        </p:txBody>
+      </p:sp>
     </p:spTree>
     <p:extLst>
       <p:ext uri="{BB962C8B-B14F-4D97-AF65-F5344CB8AC3E}">
@@ -5579,10 +6387,10 @@
       </p:grpSpPr>
       <p:pic>
         <p:nvPicPr>
-          <p:cNvPr id="2" name="Imagen 1" descr="Imagen que contiene señal, dibujo, vidrio&#10;&#10;Descripción generada automáticamente">
+          <p:cNvPr id="2" name="Imagen 1" descr="Un dibujo de un perro&#10;&#10;Descripción generada automáticamente con confianza media">
             <a:extLst>
               <a:ext uri="{FF2B5EF4-FFF2-40B4-BE49-F238E27FC236}">
-                <a16:creationId xmlns:a16="http://schemas.microsoft.com/office/drawing/2014/main" id="{E44319EE-0ACD-91D5-1E4F-3A17442B4115}"/>
+                <a16:creationId xmlns:a16="http://schemas.microsoft.com/office/drawing/2014/main" id="{565D1A3F-FF44-B8F5-3A73-019415A1693F}"/>
               </a:ext>
             </a:extLst>
           </p:cNvPr>
@@ -5613,10 +6421,42 @@
           </a:prstGeom>
         </p:spPr>
       </p:pic>
+      <p:sp>
+        <p:nvSpPr>
+          <p:cNvPr id="3" name="Marcador de número de diapositiva 2">
+            <a:extLst>
+              <a:ext uri="{FF2B5EF4-FFF2-40B4-BE49-F238E27FC236}">
+                <a16:creationId xmlns:a16="http://schemas.microsoft.com/office/drawing/2014/main" id="{603F54B8-834E-02EE-496C-326A15B75B58}"/>
+              </a:ext>
+            </a:extLst>
+          </p:cNvPr>
+          <p:cNvSpPr>
+            <a:spLocks noGrp="1"/>
+          </p:cNvSpPr>
+          <p:nvPr>
+            <p:ph type="sldNum" sz="quarter" idx="12"/>
+          </p:nvPr>
+        </p:nvSpPr>
+        <p:spPr/>
+        <p:txBody>
+          <a:bodyPr/>
+          <a:lstStyle/>
+          <a:p>
+            <a:pPr>
+              <a:defRPr/>
+            </a:pPr>
+            <a:fld id="{08395586-F03A-48D1-94DF-16B239DF4FB5}" type="slidenum">
+              <a:rPr lang="es-ES" smtClean="0"/>
+              <a:t>7</a:t>
+            </a:fld>
+            <a:endParaRPr lang="es-ES"/>
+          </a:p>
+        </p:txBody>
+      </p:sp>
     </p:spTree>
     <p:extLst>
       <p:ext uri="{BB962C8B-B14F-4D97-AF65-F5344CB8AC3E}">
-        <p14:creationId xmlns:p14="http://schemas.microsoft.com/office/powerpoint/2010/main" val="3883062087"/>
+        <p14:creationId xmlns:p14="http://schemas.microsoft.com/office/powerpoint/2010/main" val="1326012889"/>
       </p:ext>
     </p:extLst>
   </p:cSld>
@@ -5645,10 +6485,10 @@
       </p:grpSpPr>
       <p:pic>
         <p:nvPicPr>
-          <p:cNvPr id="2" name="Imagen 1" descr="Imagen que contiene Rectángulo&#10;&#10;Descripción generada automáticamente">
+          <p:cNvPr id="2" name="Imagen 1" descr="Imagen que contiene señal, dibujo, vidrio&#10;&#10;Descripción generada automáticamente">
             <a:extLst>
               <a:ext uri="{FF2B5EF4-FFF2-40B4-BE49-F238E27FC236}">
-                <a16:creationId xmlns:a16="http://schemas.microsoft.com/office/drawing/2014/main" id="{B7F6F837-5CDC-378B-0F7D-024A3C248596}"/>
+                <a16:creationId xmlns:a16="http://schemas.microsoft.com/office/drawing/2014/main" id="{E44319EE-0ACD-91D5-1E4F-3A17442B4115}"/>
               </a:ext>
             </a:extLst>
           </p:cNvPr>
@@ -5679,10 +6519,42 @@
           </a:prstGeom>
         </p:spPr>
       </p:pic>
+      <p:sp>
+        <p:nvSpPr>
+          <p:cNvPr id="3" name="Marcador de número de diapositiva 2">
+            <a:extLst>
+              <a:ext uri="{FF2B5EF4-FFF2-40B4-BE49-F238E27FC236}">
+                <a16:creationId xmlns:a16="http://schemas.microsoft.com/office/drawing/2014/main" id="{32601E9C-5A74-37A7-2B69-7330229A5903}"/>
+              </a:ext>
+            </a:extLst>
+          </p:cNvPr>
+          <p:cNvSpPr>
+            <a:spLocks noGrp="1"/>
+          </p:cNvSpPr>
+          <p:nvPr>
+            <p:ph type="sldNum" sz="quarter" idx="12"/>
+          </p:nvPr>
+        </p:nvSpPr>
+        <p:spPr/>
+        <p:txBody>
+          <a:bodyPr/>
+          <a:lstStyle/>
+          <a:p>
+            <a:pPr>
+              <a:defRPr/>
+            </a:pPr>
+            <a:fld id="{08395586-F03A-48D1-94DF-16B239DF4FB5}" type="slidenum">
+              <a:rPr lang="es-ES" smtClean="0"/>
+              <a:t>8</a:t>
+            </a:fld>
+            <a:endParaRPr lang="es-ES"/>
+          </a:p>
+        </p:txBody>
+      </p:sp>
     </p:spTree>
     <p:extLst>
       <p:ext uri="{BB962C8B-B14F-4D97-AF65-F5344CB8AC3E}">
-        <p14:creationId xmlns:p14="http://schemas.microsoft.com/office/powerpoint/2010/main" val="2481264377"/>
+        <p14:creationId xmlns:p14="http://schemas.microsoft.com/office/powerpoint/2010/main" val="3883062087"/>
       </p:ext>
     </p:extLst>
   </p:cSld>
@@ -5745,6 +6617,38 @@
           </a:prstGeom>
         </p:spPr>
       </p:pic>
+      <p:sp>
+        <p:nvSpPr>
+          <p:cNvPr id="3" name="Marcador de número de diapositiva 2">
+            <a:extLst>
+              <a:ext uri="{FF2B5EF4-FFF2-40B4-BE49-F238E27FC236}">
+                <a16:creationId xmlns:a16="http://schemas.microsoft.com/office/drawing/2014/main" id="{527C780D-47FD-4395-27C2-8D4CEDA9BD25}"/>
+              </a:ext>
+            </a:extLst>
+          </p:cNvPr>
+          <p:cNvSpPr>
+            <a:spLocks noGrp="1"/>
+          </p:cNvSpPr>
+          <p:nvPr>
+            <p:ph type="sldNum" sz="quarter" idx="12"/>
+          </p:nvPr>
+        </p:nvSpPr>
+        <p:spPr/>
+        <p:txBody>
+          <a:bodyPr/>
+          <a:lstStyle/>
+          <a:p>
+            <a:pPr>
+              <a:defRPr/>
+            </a:pPr>
+            <a:fld id="{08395586-F03A-48D1-94DF-16B239DF4FB5}" type="slidenum">
+              <a:rPr lang="es-ES" smtClean="0"/>
+              <a:t>9</a:t>
+            </a:fld>
+            <a:endParaRPr lang="es-ES"/>
+          </a:p>
+        </p:txBody>
+      </p:sp>
     </p:spTree>
     <p:extLst>
       <p:ext uri="{BB962C8B-B14F-4D97-AF65-F5344CB8AC3E}">

</xml_diff>